<commit_message>
Updated players assets and added land asset
</commit_message>
<xml_diff>
--- a/misc/assets.pptx
+++ b/misc/assets.pptx
@@ -13,7 +13,8 @@
     <p:sldId id="262" r:id="rId7"/>
     <p:sldId id="263" r:id="rId8"/>
     <p:sldId id="264" r:id="rId9"/>
-    <p:sldId id="256" r:id="rId10"/>
+    <p:sldId id="265" r:id="rId10"/>
+    <p:sldId id="256" r:id="rId11"/>
   </p:sldIdLst>
   <p:sldSz cx="12192000" cy="6858000"/>
   <p:notesSz cx="6858000" cy="9144000"/>
@@ -129,6 +130,7 @@
             <p14:sldId id="262"/>
             <p14:sldId id="263"/>
             <p14:sldId id="264"/>
+            <p14:sldId id="265"/>
           </p14:sldIdLst>
         </p14:section>
         <p14:section name="Misc" id="{3AACF2D1-D57A-3549-A361-98AE82C6DA38}">
@@ -3766,6 +3768,190 @@
 </p:sld>
 </file>
 
+<file path=ppt/slides/slide10.xml><?xml version="1.0" encoding="utf-8"?>
+<p:sld xmlns:a="http://schemas.openxmlformats.org/drawingml/2006/main" xmlns:r="http://schemas.openxmlformats.org/officeDocument/2006/relationships" xmlns:p="http://schemas.openxmlformats.org/presentationml/2006/main">
+  <p:cSld>
+    <p:spTree>
+      <p:nvGrpSpPr>
+        <p:cNvPr id="1" name=""/>
+        <p:cNvGrpSpPr/>
+        <p:nvPr/>
+      </p:nvGrpSpPr>
+      <p:grpSpPr>
+        <a:xfrm>
+          <a:off x="0" y="0"/>
+          <a:ext cx="0" cy="0"/>
+          <a:chOff x="0" y="0"/>
+          <a:chExt cx="0" cy="0"/>
+        </a:xfrm>
+      </p:grpSpPr>
+      <p:sp>
+        <p:nvSpPr>
+          <p:cNvPr id="6" name="Freeform 5">
+            <a:extLst>
+              <a:ext uri="{FF2B5EF4-FFF2-40B4-BE49-F238E27FC236}">
+                <a16:creationId xmlns:a16="http://schemas.microsoft.com/office/drawing/2014/main" id="{DDD531F7-1C48-3443-A7EB-7E94A5AFD404}"/>
+              </a:ext>
+            </a:extLst>
+          </p:cNvPr>
+          <p:cNvSpPr/>
+          <p:nvPr/>
+        </p:nvSpPr>
+        <p:spPr>
+          <a:xfrm>
+            <a:off x="3000776" y="1056067"/>
+            <a:ext cx="4262908" cy="4262908"/>
+          </a:xfrm>
+          <a:custGeom>
+            <a:avLst/>
+            <a:gdLst>
+              <a:gd name="connsiteX0" fmla="*/ 2131453 w 4262908"/>
+              <a:gd name="connsiteY0" fmla="*/ 192645 h 4262908"/>
+              <a:gd name="connsiteX1" fmla="*/ 239217 w 4262908"/>
+              <a:gd name="connsiteY1" fmla="*/ 2131453 h 4262908"/>
+              <a:gd name="connsiteX2" fmla="*/ 2131453 w 4262908"/>
+              <a:gd name="connsiteY2" fmla="*/ 4070261 h 4262908"/>
+              <a:gd name="connsiteX3" fmla="*/ 4023689 w 4262908"/>
+              <a:gd name="connsiteY3" fmla="*/ 2131453 h 4262908"/>
+              <a:gd name="connsiteX4" fmla="*/ 2131453 w 4262908"/>
+              <a:gd name="connsiteY4" fmla="*/ 192645 h 4262908"/>
+              <a:gd name="connsiteX5" fmla="*/ 2131454 w 4262908"/>
+              <a:gd name="connsiteY5" fmla="*/ 0 h 4262908"/>
+              <a:gd name="connsiteX6" fmla="*/ 4262908 w 4262908"/>
+              <a:gd name="connsiteY6" fmla="*/ 2131454 h 4262908"/>
+              <a:gd name="connsiteX7" fmla="*/ 2131454 w 4262908"/>
+              <a:gd name="connsiteY7" fmla="*/ 4262908 h 4262908"/>
+              <a:gd name="connsiteX8" fmla="*/ 0 w 4262908"/>
+              <a:gd name="connsiteY8" fmla="*/ 2131454 h 4262908"/>
+              <a:gd name="connsiteX9" fmla="*/ 2131454 w 4262908"/>
+              <a:gd name="connsiteY9" fmla="*/ 0 h 4262908"/>
+            </a:gdLst>
+            <a:ahLst/>
+            <a:cxnLst>
+              <a:cxn ang="0">
+                <a:pos x="connsiteX0" y="connsiteY0"/>
+              </a:cxn>
+              <a:cxn ang="0">
+                <a:pos x="connsiteX1" y="connsiteY1"/>
+              </a:cxn>
+              <a:cxn ang="0">
+                <a:pos x="connsiteX2" y="connsiteY2"/>
+              </a:cxn>
+              <a:cxn ang="0">
+                <a:pos x="connsiteX3" y="connsiteY3"/>
+              </a:cxn>
+              <a:cxn ang="0">
+                <a:pos x="connsiteX4" y="connsiteY4"/>
+              </a:cxn>
+              <a:cxn ang="0">
+                <a:pos x="connsiteX5" y="connsiteY5"/>
+              </a:cxn>
+              <a:cxn ang="0">
+                <a:pos x="connsiteX6" y="connsiteY6"/>
+              </a:cxn>
+              <a:cxn ang="0">
+                <a:pos x="connsiteX7" y="connsiteY7"/>
+              </a:cxn>
+              <a:cxn ang="0">
+                <a:pos x="connsiteX8" y="connsiteY8"/>
+              </a:cxn>
+              <a:cxn ang="0">
+                <a:pos x="connsiteX9" y="connsiteY9"/>
+              </a:cxn>
+            </a:cxnLst>
+            <a:rect l="l" t="t" r="r" b="b"/>
+            <a:pathLst>
+              <a:path w="4262908" h="4262908">
+                <a:moveTo>
+                  <a:pt x="2131453" y="192645"/>
+                </a:moveTo>
+                <a:cubicBezTo>
+                  <a:pt x="1086400" y="192645"/>
+                  <a:pt x="239217" y="1060679"/>
+                  <a:pt x="239217" y="2131453"/>
+                </a:cubicBezTo>
+                <a:cubicBezTo>
+                  <a:pt x="239217" y="3202227"/>
+                  <a:pt x="1086400" y="4070261"/>
+                  <a:pt x="2131453" y="4070261"/>
+                </a:cubicBezTo>
+                <a:cubicBezTo>
+                  <a:pt x="3176506" y="4070261"/>
+                  <a:pt x="4023689" y="3202227"/>
+                  <a:pt x="4023689" y="2131453"/>
+                </a:cubicBezTo>
+                <a:cubicBezTo>
+                  <a:pt x="4023689" y="1060679"/>
+                  <a:pt x="3176506" y="192645"/>
+                  <a:pt x="2131453" y="192645"/>
+                </a:cubicBezTo>
+                <a:close/>
+                <a:moveTo>
+                  <a:pt x="2131454" y="0"/>
+                </a:moveTo>
+                <a:cubicBezTo>
+                  <a:pt x="3308624" y="0"/>
+                  <a:pt x="4262908" y="954284"/>
+                  <a:pt x="4262908" y="2131454"/>
+                </a:cubicBezTo>
+                <a:cubicBezTo>
+                  <a:pt x="4262908" y="3308624"/>
+                  <a:pt x="3308624" y="4262908"/>
+                  <a:pt x="2131454" y="4262908"/>
+                </a:cubicBezTo>
+                <a:cubicBezTo>
+                  <a:pt x="954284" y="4262908"/>
+                  <a:pt x="0" y="3308624"/>
+                  <a:pt x="0" y="2131454"/>
+                </a:cubicBezTo>
+                <a:cubicBezTo>
+                  <a:pt x="0" y="954284"/>
+                  <a:pt x="954284" y="0"/>
+                  <a:pt x="2131454" y="0"/>
+                </a:cubicBezTo>
+                <a:close/>
+              </a:path>
+            </a:pathLst>
+          </a:custGeom>
+        </p:spPr>
+        <p:style>
+          <a:lnRef idx="2">
+            <a:schemeClr val="dk1">
+              <a:shade val="50000"/>
+            </a:schemeClr>
+          </a:lnRef>
+          <a:fillRef idx="1">
+            <a:schemeClr val="dk1"/>
+          </a:fillRef>
+          <a:effectRef idx="0">
+            <a:schemeClr val="dk1"/>
+          </a:effectRef>
+          <a:fontRef idx="minor">
+            <a:schemeClr val="lt1"/>
+          </a:fontRef>
+        </p:style>
+        <p:txBody>
+          <a:bodyPr rtlCol="0" anchor="ctr"/>
+          <a:lstStyle/>
+          <a:p>
+            <a:pPr algn="ctr"/>
+            <a:endParaRPr lang="en-CH"/>
+          </a:p>
+        </p:txBody>
+      </p:sp>
+    </p:spTree>
+    <p:extLst>
+      <p:ext uri="{BB962C8B-B14F-4D97-AF65-F5344CB8AC3E}">
+        <p14:creationId xmlns:p14="http://schemas.microsoft.com/office/powerpoint/2010/main" val="2117145046"/>
+      </p:ext>
+    </p:extLst>
+  </p:cSld>
+  <p:clrMapOvr>
+    <a:masterClrMapping/>
+  </p:clrMapOvr>
+</p:sld>
+</file>
+
 <file path=ppt/slides/slide2.xml><?xml version="1.0" encoding="utf-8"?>
 <p:sld xmlns:a="http://schemas.openxmlformats.org/drawingml/2006/main" xmlns:r="http://schemas.openxmlformats.org/officeDocument/2006/relationships" xmlns:p="http://schemas.openxmlformats.org/presentationml/2006/main">
   <p:cSld>
@@ -6176,10 +6362,45 @@
       </p:grpSpPr>
       <p:sp>
         <p:nvSpPr>
-          <p:cNvPr id="6" name="Freeform 5">
-            <a:extLst>
-              <a:ext uri="{FF2B5EF4-FFF2-40B4-BE49-F238E27FC236}">
-                <a16:creationId xmlns:a16="http://schemas.microsoft.com/office/drawing/2014/main" id="{DDD531F7-1C48-3443-A7EB-7E94A5AFD404}"/>
+          <p:cNvPr id="4" name="TextBox 3">
+            <a:extLst>
+              <a:ext uri="{FF2B5EF4-FFF2-40B4-BE49-F238E27FC236}">
+                <a16:creationId xmlns:a16="http://schemas.microsoft.com/office/drawing/2014/main" id="{83FAF6FD-4CC6-8048-BA7F-4837C86E16AE}"/>
+              </a:ext>
+            </a:extLst>
+          </p:cNvPr>
+          <p:cNvSpPr txBox="1"/>
+          <p:nvPr/>
+        </p:nvSpPr>
+        <p:spPr>
+          <a:xfrm>
+            <a:off x="270456" y="283335"/>
+            <a:ext cx="636713" cy="369332"/>
+          </a:xfrm>
+          <a:prstGeom prst="rect">
+            <a:avLst/>
+          </a:prstGeom>
+          <a:noFill/>
+        </p:spPr>
+        <p:txBody>
+          <a:bodyPr wrap="none" rtlCol="0">
+            <a:spAutoFit/>
+          </a:bodyPr>
+          <a:lstStyle/>
+          <a:p>
+            <a:r>
+              <a:rPr lang="en-CH" dirty="0"/>
+              <a:t>Land</a:t>
+            </a:r>
+          </a:p>
+        </p:txBody>
+      </p:sp>
+      <p:sp>
+        <p:nvSpPr>
+          <p:cNvPr id="7" name="Freeform 6">
+            <a:extLst>
+              <a:ext uri="{FF2B5EF4-FFF2-40B4-BE49-F238E27FC236}">
+                <a16:creationId xmlns:a16="http://schemas.microsoft.com/office/drawing/2014/main" id="{3565338C-4843-9C44-9007-87EC3856C0A0}"/>
               </a:ext>
             </a:extLst>
           </p:cNvPr>
@@ -6188,32 +6409,32 @@
         </p:nvSpPr>
         <p:spPr>
           <a:xfrm>
-            <a:off x="3000776" y="1056067"/>
-            <a:ext cx="4262908" cy="4262908"/>
+            <a:off x="2863403" y="196403"/>
+            <a:ext cx="6465194" cy="6465194"/>
           </a:xfrm>
           <a:custGeom>
             <a:avLst/>
             <a:gdLst>
-              <a:gd name="connsiteX0" fmla="*/ 2131453 w 4262908"/>
-              <a:gd name="connsiteY0" fmla="*/ 192645 h 4262908"/>
-              <a:gd name="connsiteX1" fmla="*/ 239217 w 4262908"/>
-              <a:gd name="connsiteY1" fmla="*/ 2131453 h 4262908"/>
-              <a:gd name="connsiteX2" fmla="*/ 2131453 w 4262908"/>
-              <a:gd name="connsiteY2" fmla="*/ 4070261 h 4262908"/>
-              <a:gd name="connsiteX3" fmla="*/ 4023689 w 4262908"/>
-              <a:gd name="connsiteY3" fmla="*/ 2131453 h 4262908"/>
-              <a:gd name="connsiteX4" fmla="*/ 2131453 w 4262908"/>
-              <a:gd name="connsiteY4" fmla="*/ 192645 h 4262908"/>
-              <a:gd name="connsiteX5" fmla="*/ 2131454 w 4262908"/>
-              <a:gd name="connsiteY5" fmla="*/ 0 h 4262908"/>
-              <a:gd name="connsiteX6" fmla="*/ 4262908 w 4262908"/>
-              <a:gd name="connsiteY6" fmla="*/ 2131454 h 4262908"/>
-              <a:gd name="connsiteX7" fmla="*/ 2131454 w 4262908"/>
-              <a:gd name="connsiteY7" fmla="*/ 4262908 h 4262908"/>
-              <a:gd name="connsiteX8" fmla="*/ 0 w 4262908"/>
-              <a:gd name="connsiteY8" fmla="*/ 2131454 h 4262908"/>
-              <a:gd name="connsiteX9" fmla="*/ 2131454 w 4262908"/>
-              <a:gd name="connsiteY9" fmla="*/ 0 h 4262908"/>
+              <a:gd name="connsiteX0" fmla="*/ 3232597 w 6465194"/>
+              <a:gd name="connsiteY0" fmla="*/ 76200 h 6465194"/>
+              <a:gd name="connsiteX1" fmla="*/ 76200 w 6465194"/>
+              <a:gd name="connsiteY1" fmla="*/ 3232597 h 6465194"/>
+              <a:gd name="connsiteX2" fmla="*/ 3232597 w 6465194"/>
+              <a:gd name="connsiteY2" fmla="*/ 6388994 h 6465194"/>
+              <a:gd name="connsiteX3" fmla="*/ 6388994 w 6465194"/>
+              <a:gd name="connsiteY3" fmla="*/ 3232597 h 6465194"/>
+              <a:gd name="connsiteX4" fmla="*/ 3232597 w 6465194"/>
+              <a:gd name="connsiteY4" fmla="*/ 76200 h 6465194"/>
+              <a:gd name="connsiteX5" fmla="*/ 3232597 w 6465194"/>
+              <a:gd name="connsiteY5" fmla="*/ 0 h 6465194"/>
+              <a:gd name="connsiteX6" fmla="*/ 6465194 w 6465194"/>
+              <a:gd name="connsiteY6" fmla="*/ 3232597 h 6465194"/>
+              <a:gd name="connsiteX7" fmla="*/ 3232597 w 6465194"/>
+              <a:gd name="connsiteY7" fmla="*/ 6465194 h 6465194"/>
+              <a:gd name="connsiteX8" fmla="*/ 0 w 6465194"/>
+              <a:gd name="connsiteY8" fmla="*/ 3232597 h 6465194"/>
+              <a:gd name="connsiteX9" fmla="*/ 3232597 w 6465194"/>
+              <a:gd name="connsiteY9" fmla="*/ 0 h 6465194"/>
             </a:gdLst>
             <a:ahLst/>
             <a:cxnLst>
@@ -6250,70 +6471,76 @@
             </a:cxnLst>
             <a:rect l="l" t="t" r="r" b="b"/>
             <a:pathLst>
-              <a:path w="4262908" h="4262908">
+              <a:path w="6465194" h="6465194">
                 <a:moveTo>
-                  <a:pt x="2131453" y="192645"/>
+                  <a:pt x="3232597" y="76200"/>
                 </a:moveTo>
                 <a:cubicBezTo>
-                  <a:pt x="1086400" y="192645"/>
-                  <a:pt x="239217" y="1060679"/>
-                  <a:pt x="239217" y="2131453"/>
+                  <a:pt x="1489367" y="76200"/>
+                  <a:pt x="76200" y="1489367"/>
+                  <a:pt x="76200" y="3232597"/>
                 </a:cubicBezTo>
                 <a:cubicBezTo>
-                  <a:pt x="239217" y="3202227"/>
-                  <a:pt x="1086400" y="4070261"/>
-                  <a:pt x="2131453" y="4070261"/>
+                  <a:pt x="76200" y="4975827"/>
+                  <a:pt x="1489367" y="6388994"/>
+                  <a:pt x="3232597" y="6388994"/>
                 </a:cubicBezTo>
                 <a:cubicBezTo>
-                  <a:pt x="3176506" y="4070261"/>
-                  <a:pt x="4023689" y="3202227"/>
-                  <a:pt x="4023689" y="2131453"/>
+                  <a:pt x="4975827" y="6388994"/>
+                  <a:pt x="6388994" y="4975827"/>
+                  <a:pt x="6388994" y="3232597"/>
                 </a:cubicBezTo>
                 <a:cubicBezTo>
-                  <a:pt x="4023689" y="1060679"/>
-                  <a:pt x="3176506" y="192645"/>
-                  <a:pt x="2131453" y="192645"/>
+                  <a:pt x="6388994" y="1489367"/>
+                  <a:pt x="4975827" y="76200"/>
+                  <a:pt x="3232597" y="76200"/>
                 </a:cubicBezTo>
                 <a:close/>
                 <a:moveTo>
-                  <a:pt x="2131454" y="0"/>
+                  <a:pt x="3232597" y="0"/>
                 </a:moveTo>
                 <a:cubicBezTo>
-                  <a:pt x="3308624" y="0"/>
-                  <a:pt x="4262908" y="954284"/>
-                  <a:pt x="4262908" y="2131454"/>
+                  <a:pt x="5017911" y="0"/>
+                  <a:pt x="6465194" y="1447283"/>
+                  <a:pt x="6465194" y="3232597"/>
                 </a:cubicBezTo>
                 <a:cubicBezTo>
-                  <a:pt x="4262908" y="3308624"/>
-                  <a:pt x="3308624" y="4262908"/>
-                  <a:pt x="2131454" y="4262908"/>
+                  <a:pt x="6465194" y="5017911"/>
+                  <a:pt x="5017911" y="6465194"/>
+                  <a:pt x="3232597" y="6465194"/>
                 </a:cubicBezTo>
                 <a:cubicBezTo>
-                  <a:pt x="954284" y="4262908"/>
-                  <a:pt x="0" y="3308624"/>
-                  <a:pt x="0" y="2131454"/>
+                  <a:pt x="1447283" y="6465194"/>
+                  <a:pt x="0" y="5017911"/>
+                  <a:pt x="0" y="3232597"/>
                 </a:cubicBezTo>
                 <a:cubicBezTo>
-                  <a:pt x="0" y="954284"/>
-                  <a:pt x="954284" y="0"/>
-                  <a:pt x="2131454" y="0"/>
+                  <a:pt x="0" y="1447283"/>
+                  <a:pt x="1447283" y="0"/>
+                  <a:pt x="3232597" y="0"/>
                 </a:cubicBezTo>
                 <a:close/>
               </a:path>
             </a:pathLst>
           </a:custGeom>
+          <a:solidFill>
+            <a:schemeClr val="tx1"/>
+          </a:solidFill>
+          <a:ln w="38100">
+            <a:noFill/>
+          </a:ln>
         </p:spPr>
         <p:style>
           <a:lnRef idx="2">
-            <a:schemeClr val="dk1">
+            <a:schemeClr val="accent1">
               <a:shade val="50000"/>
             </a:schemeClr>
           </a:lnRef>
           <a:fillRef idx="1">
-            <a:schemeClr val="dk1"/>
+            <a:schemeClr val="accent1"/>
           </a:fillRef>
           <a:effectRef idx="0">
-            <a:schemeClr val="dk1"/>
+            <a:schemeClr val="accent1"/>
           </a:effectRef>
           <a:fontRef idx="minor">
             <a:schemeClr val="lt1"/>
@@ -6331,7 +6558,7 @@
     </p:spTree>
     <p:extLst>
       <p:ext uri="{BB962C8B-B14F-4D97-AF65-F5344CB8AC3E}">
-        <p14:creationId xmlns:p14="http://schemas.microsoft.com/office/powerpoint/2010/main" val="2117145046"/>
+        <p14:creationId xmlns:p14="http://schemas.microsoft.com/office/powerpoint/2010/main" val="862890566"/>
       </p:ext>
     </p:extLst>
   </p:cSld>

</xml_diff>

<commit_message>
Forgot to save the pptx :<
</commit_message>
<xml_diff>
--- a/misc/assets.pptx
+++ b/misc/assets.pptx
@@ -6176,9 +6176,12 @@
           <a:prstGeom prst="rect">
             <a:avLst/>
           </a:prstGeom>
+          <a:solidFill>
+            <a:srgbClr val="00B14F"/>
+          </a:solidFill>
           <a:ln w="76200">
             <a:solidFill>
-              <a:schemeClr val="bg1"/>
+              <a:schemeClr val="tx1"/>
             </a:solidFill>
           </a:ln>
         </p:spPr>
@@ -6297,7 +6300,7 @@
             <a:avLst/>
           </a:prstGeom>
           <a:solidFill>
-            <a:schemeClr val="bg1"/>
+            <a:srgbClr val="C00000"/>
           </a:solidFill>
           <a:ln w="76200">
             <a:solidFill>
@@ -6523,9 +6526,24 @@
               </a:path>
             </a:pathLst>
           </a:custGeom>
-          <a:solidFill>
-            <a:schemeClr val="tx1"/>
-          </a:solidFill>
+          <a:gradFill flip="none" rotWithShape="1">
+            <a:gsLst>
+              <a:gs pos="0">
+                <a:srgbClr val="C00000"/>
+              </a:gs>
+              <a:gs pos="50000">
+                <a:srgbClr val="FF0000"/>
+              </a:gs>
+              <a:gs pos="50000">
+                <a:srgbClr val="00B050"/>
+              </a:gs>
+              <a:gs pos="100000">
+                <a:srgbClr val="00B14F"/>
+              </a:gs>
+            </a:gsLst>
+            <a:lin ang="2700000" scaled="1"/>
+            <a:tileRect/>
+          </a:gradFill>
           <a:ln w="38100">
             <a:noFill/>
           </a:ln>

</xml_diff>

<commit_message>
Updated introduction: added apple scene, added keys scene, added game logo
</commit_message>
<xml_diff>
--- a/misc/assets.pptx
+++ b/misc/assets.pptx
@@ -16,7 +16,11 @@
     <p:sldId id="265" r:id="rId10"/>
     <p:sldId id="266" r:id="rId11"/>
     <p:sldId id="267" r:id="rId12"/>
-    <p:sldId id="256" r:id="rId13"/>
+    <p:sldId id="268" r:id="rId13"/>
+    <p:sldId id="270" r:id="rId14"/>
+    <p:sldId id="271" r:id="rId15"/>
+    <p:sldId id="272" r:id="rId16"/>
+    <p:sldId id="256" r:id="rId17"/>
   </p:sldIdLst>
   <p:sldSz cx="12192000" cy="6858000"/>
   <p:notesSz cx="6858000" cy="9144000"/>
@@ -135,6 +139,10 @@
             <p14:sldId id="265"/>
             <p14:sldId id="266"/>
             <p14:sldId id="267"/>
+            <p14:sldId id="268"/>
+            <p14:sldId id="270"/>
+            <p14:sldId id="271"/>
+            <p14:sldId id="272"/>
           </p14:sldIdLst>
         </p14:section>
         <p14:section name="Misc" id="{3AACF2D1-D57A-3549-A361-98AE82C6DA38}">
@@ -300,7 +308,7 @@
           <a:p>
             <a:fld id="{C5B62D66-53AC-4F47-A05A-D3A5C2801396}" type="datetimeFigureOut">
               <a:rPr lang="en-CH" smtClean="0"/>
-              <a:t>24.04.20</a:t>
+              <a:t>02.05.20</a:t>
             </a:fld>
             <a:endParaRPr lang="en-CH"/>
           </a:p>
@@ -500,7 +508,7 @@
           <a:p>
             <a:fld id="{C5B62D66-53AC-4F47-A05A-D3A5C2801396}" type="datetimeFigureOut">
               <a:rPr lang="en-CH" smtClean="0"/>
-              <a:t>24.04.20</a:t>
+              <a:t>02.05.20</a:t>
             </a:fld>
             <a:endParaRPr lang="en-CH"/>
           </a:p>
@@ -710,7 +718,7 @@
           <a:p>
             <a:fld id="{C5B62D66-53AC-4F47-A05A-D3A5C2801396}" type="datetimeFigureOut">
               <a:rPr lang="en-CH" smtClean="0"/>
-              <a:t>24.04.20</a:t>
+              <a:t>02.05.20</a:t>
             </a:fld>
             <a:endParaRPr lang="en-CH"/>
           </a:p>
@@ -910,7 +918,7 @@
           <a:p>
             <a:fld id="{C5B62D66-53AC-4F47-A05A-D3A5C2801396}" type="datetimeFigureOut">
               <a:rPr lang="en-CH" smtClean="0"/>
-              <a:t>24.04.20</a:t>
+              <a:t>02.05.20</a:t>
             </a:fld>
             <a:endParaRPr lang="en-CH"/>
           </a:p>
@@ -1186,7 +1194,7 @@
           <a:p>
             <a:fld id="{C5B62D66-53AC-4F47-A05A-D3A5C2801396}" type="datetimeFigureOut">
               <a:rPr lang="en-CH" smtClean="0"/>
-              <a:t>24.04.20</a:t>
+              <a:t>02.05.20</a:t>
             </a:fld>
             <a:endParaRPr lang="en-CH"/>
           </a:p>
@@ -1454,7 +1462,7 @@
           <a:p>
             <a:fld id="{C5B62D66-53AC-4F47-A05A-D3A5C2801396}" type="datetimeFigureOut">
               <a:rPr lang="en-CH" smtClean="0"/>
-              <a:t>24.04.20</a:t>
+              <a:t>02.05.20</a:t>
             </a:fld>
             <a:endParaRPr lang="en-CH"/>
           </a:p>
@@ -1869,7 +1877,7 @@
           <a:p>
             <a:fld id="{C5B62D66-53AC-4F47-A05A-D3A5C2801396}" type="datetimeFigureOut">
               <a:rPr lang="en-CH" smtClean="0"/>
-              <a:t>24.04.20</a:t>
+              <a:t>02.05.20</a:t>
             </a:fld>
             <a:endParaRPr lang="en-CH"/>
           </a:p>
@@ -2011,7 +2019,7 @@
           <a:p>
             <a:fld id="{C5B62D66-53AC-4F47-A05A-D3A5C2801396}" type="datetimeFigureOut">
               <a:rPr lang="en-CH" smtClean="0"/>
-              <a:t>24.04.20</a:t>
+              <a:t>02.05.20</a:t>
             </a:fld>
             <a:endParaRPr lang="en-CH"/>
           </a:p>
@@ -2124,7 +2132,7 @@
           <a:p>
             <a:fld id="{C5B62D66-53AC-4F47-A05A-D3A5C2801396}" type="datetimeFigureOut">
               <a:rPr lang="en-CH" smtClean="0"/>
-              <a:t>24.04.20</a:t>
+              <a:t>02.05.20</a:t>
             </a:fld>
             <a:endParaRPr lang="en-CH"/>
           </a:p>
@@ -2437,7 +2445,7 @@
           <a:p>
             <a:fld id="{C5B62D66-53AC-4F47-A05A-D3A5C2801396}" type="datetimeFigureOut">
               <a:rPr lang="en-CH" smtClean="0"/>
-              <a:t>24.04.20</a:t>
+              <a:t>02.05.20</a:t>
             </a:fld>
             <a:endParaRPr lang="en-CH"/>
           </a:p>
@@ -2726,7 +2734,7 @@
           <a:p>
             <a:fld id="{C5B62D66-53AC-4F47-A05A-D3A5C2801396}" type="datetimeFigureOut">
               <a:rPr lang="en-CH" smtClean="0"/>
-              <a:t>24.04.20</a:t>
+              <a:t>02.05.20</a:t>
             </a:fld>
             <a:endParaRPr lang="en-CH"/>
           </a:p>
@@ -2969,7 +2977,7 @@
           <a:p>
             <a:fld id="{C5B62D66-53AC-4F47-A05A-D3A5C2801396}" type="datetimeFigureOut">
               <a:rPr lang="en-CH" smtClean="0"/>
-              <a:t>24.04.20</a:t>
+              <a:t>02.05.20</a:t>
             </a:fld>
             <a:endParaRPr lang="en-CH"/>
           </a:p>
@@ -8140,6 +8148,1963 @@
 </file>
 
 <file path=ppt/slides/slide12.xml><?xml version="1.0" encoding="utf-8"?>
+<p:sld xmlns:a="http://schemas.openxmlformats.org/drawingml/2006/main" xmlns:r="http://schemas.openxmlformats.org/officeDocument/2006/relationships" xmlns:p="http://schemas.openxmlformats.org/presentationml/2006/main">
+  <p:cSld>
+    <p:spTree>
+      <p:nvGrpSpPr>
+        <p:cNvPr id="1" name=""/>
+        <p:cNvGrpSpPr/>
+        <p:nvPr/>
+      </p:nvGrpSpPr>
+      <p:grpSpPr>
+        <a:xfrm>
+          <a:off x="0" y="0"/>
+          <a:ext cx="0" cy="0"/>
+          <a:chOff x="0" y="0"/>
+          <a:chExt cx="0" cy="0"/>
+        </a:xfrm>
+      </p:grpSpPr>
+      <p:grpSp>
+        <p:nvGrpSpPr>
+          <p:cNvPr id="19" name="Group 18">
+            <a:extLst>
+              <a:ext uri="{FF2B5EF4-FFF2-40B4-BE49-F238E27FC236}">
+                <a16:creationId xmlns:a16="http://schemas.microsoft.com/office/drawing/2014/main" id="{075129E4-20FF-5746-A813-E1EC88A65FEC}"/>
+              </a:ext>
+            </a:extLst>
+          </p:cNvPr>
+          <p:cNvGrpSpPr/>
+          <p:nvPr/>
+        </p:nvGrpSpPr>
+        <p:grpSpPr>
+          <a:xfrm>
+            <a:off x="3662973" y="4277932"/>
+            <a:ext cx="4650074" cy="2199068"/>
+            <a:chOff x="5545163" y="4351448"/>
+            <a:chExt cx="4650074" cy="2199068"/>
+          </a:xfrm>
+        </p:grpSpPr>
+        <p:grpSp>
+          <p:nvGrpSpPr>
+            <p:cNvPr id="16" name="Group 15">
+              <a:extLst>
+                <a:ext uri="{FF2B5EF4-FFF2-40B4-BE49-F238E27FC236}">
+                  <a16:creationId xmlns:a16="http://schemas.microsoft.com/office/drawing/2014/main" id="{BE264743-7B34-FD49-981E-7ABAC8B2605E}"/>
+                </a:ext>
+              </a:extLst>
+            </p:cNvPr>
+            <p:cNvGrpSpPr/>
+            <p:nvPr/>
+          </p:nvGrpSpPr>
+          <p:grpSpPr>
+            <a:xfrm>
+              <a:off x="5545163" y="4351449"/>
+              <a:ext cx="2199067" cy="2199067"/>
+              <a:chOff x="2876553" y="2329466"/>
+              <a:chExt cx="2199067" cy="2199067"/>
+            </a:xfrm>
+          </p:grpSpPr>
+          <p:sp>
+            <p:nvSpPr>
+              <p:cNvPr id="7" name="Rounded Rectangle 6">
+                <a:extLst>
+                  <a:ext uri="{FF2B5EF4-FFF2-40B4-BE49-F238E27FC236}">
+                    <a16:creationId xmlns:a16="http://schemas.microsoft.com/office/drawing/2014/main" id="{3CBFC570-F777-A64A-B529-673B90D9FB6F}"/>
+                  </a:ext>
+                </a:extLst>
+              </p:cNvPr>
+              <p:cNvSpPr/>
+              <p:nvPr/>
+            </p:nvSpPr>
+            <p:spPr>
+              <a:xfrm>
+                <a:off x="2876553" y="2329466"/>
+                <a:ext cx="2199067" cy="2199067"/>
+              </a:xfrm>
+              <a:prstGeom prst="roundRect">
+                <a:avLst/>
+              </a:prstGeom>
+            </p:spPr>
+            <p:style>
+              <a:lnRef idx="2">
+                <a:schemeClr val="dk1">
+                  <a:shade val="50000"/>
+                </a:schemeClr>
+              </a:lnRef>
+              <a:fillRef idx="1">
+                <a:schemeClr val="dk1"/>
+              </a:fillRef>
+              <a:effectRef idx="0">
+                <a:schemeClr val="dk1"/>
+              </a:effectRef>
+              <a:fontRef idx="minor">
+                <a:schemeClr val="lt1"/>
+              </a:fontRef>
+            </p:style>
+            <p:txBody>
+              <a:bodyPr rtlCol="0" anchor="ctr"/>
+              <a:lstStyle/>
+              <a:p>
+                <a:pPr algn="ctr"/>
+                <a:endParaRPr lang="en-CH" sz="19900" dirty="0"/>
+              </a:p>
+            </p:txBody>
+          </p:sp>
+          <p:sp>
+            <p:nvSpPr>
+              <p:cNvPr id="10" name="Left Arrow 9">
+                <a:extLst>
+                  <a:ext uri="{FF2B5EF4-FFF2-40B4-BE49-F238E27FC236}">
+                    <a16:creationId xmlns:a16="http://schemas.microsoft.com/office/drawing/2014/main" id="{90FDE02B-CAFB-444C-9F7B-020D44187421}"/>
+                  </a:ext>
+                </a:extLst>
+              </p:cNvPr>
+              <p:cNvSpPr/>
+              <p:nvPr/>
+            </p:nvSpPr>
+            <p:spPr>
+              <a:xfrm>
+                <a:off x="3378557" y="2893988"/>
+                <a:ext cx="1159099" cy="1070020"/>
+              </a:xfrm>
+              <a:prstGeom prst="leftArrow">
+                <a:avLst/>
+              </a:prstGeom>
+              <a:solidFill>
+                <a:schemeClr val="bg1"/>
+              </a:solidFill>
+              <a:ln>
+                <a:noFill/>
+              </a:ln>
+            </p:spPr>
+            <p:style>
+              <a:lnRef idx="2">
+                <a:schemeClr val="accent1">
+                  <a:shade val="50000"/>
+                </a:schemeClr>
+              </a:lnRef>
+              <a:fillRef idx="1">
+                <a:schemeClr val="accent1"/>
+              </a:fillRef>
+              <a:effectRef idx="0">
+                <a:schemeClr val="accent1"/>
+              </a:effectRef>
+              <a:fontRef idx="minor">
+                <a:schemeClr val="lt1"/>
+              </a:fontRef>
+            </p:style>
+            <p:txBody>
+              <a:bodyPr rtlCol="0" anchor="ctr"/>
+              <a:lstStyle/>
+              <a:p>
+                <a:pPr algn="ctr"/>
+                <a:endParaRPr lang="en-CH"/>
+              </a:p>
+            </p:txBody>
+          </p:sp>
+        </p:grpSp>
+        <p:grpSp>
+          <p:nvGrpSpPr>
+            <p:cNvPr id="18" name="Group 17">
+              <a:extLst>
+                <a:ext uri="{FF2B5EF4-FFF2-40B4-BE49-F238E27FC236}">
+                  <a16:creationId xmlns:a16="http://schemas.microsoft.com/office/drawing/2014/main" id="{3A1D9354-3A1E-5147-A508-161D81EA62E1}"/>
+                </a:ext>
+              </a:extLst>
+            </p:cNvPr>
+            <p:cNvGrpSpPr/>
+            <p:nvPr/>
+          </p:nvGrpSpPr>
+          <p:grpSpPr>
+            <a:xfrm>
+              <a:off x="7996170" y="4351448"/>
+              <a:ext cx="2199067" cy="2199067"/>
+              <a:chOff x="5327560" y="2329465"/>
+              <a:chExt cx="2199067" cy="2199067"/>
+            </a:xfrm>
+          </p:grpSpPr>
+          <p:sp>
+            <p:nvSpPr>
+              <p:cNvPr id="9" name="Rounded Rectangle 8">
+                <a:extLst>
+                  <a:ext uri="{FF2B5EF4-FFF2-40B4-BE49-F238E27FC236}">
+                    <a16:creationId xmlns:a16="http://schemas.microsoft.com/office/drawing/2014/main" id="{E87DA2D5-B5EB-D04B-8657-B4CA7D209B6C}"/>
+                  </a:ext>
+                </a:extLst>
+              </p:cNvPr>
+              <p:cNvSpPr/>
+              <p:nvPr/>
+            </p:nvSpPr>
+            <p:spPr>
+              <a:xfrm>
+                <a:off x="5327560" y="2329465"/>
+                <a:ext cx="2199067" cy="2199067"/>
+              </a:xfrm>
+              <a:prstGeom prst="roundRect">
+                <a:avLst/>
+              </a:prstGeom>
+            </p:spPr>
+            <p:style>
+              <a:lnRef idx="2">
+                <a:schemeClr val="dk1">
+                  <a:shade val="50000"/>
+                </a:schemeClr>
+              </a:lnRef>
+              <a:fillRef idx="1">
+                <a:schemeClr val="dk1"/>
+              </a:fillRef>
+              <a:effectRef idx="0">
+                <a:schemeClr val="dk1"/>
+              </a:effectRef>
+              <a:fontRef idx="minor">
+                <a:schemeClr val="lt1"/>
+              </a:fontRef>
+            </p:style>
+            <p:txBody>
+              <a:bodyPr rtlCol="0" anchor="ctr"/>
+              <a:lstStyle/>
+              <a:p>
+                <a:pPr algn="ctr"/>
+                <a:endParaRPr lang="en-CH" sz="19900" dirty="0"/>
+              </a:p>
+            </p:txBody>
+          </p:sp>
+          <p:sp>
+            <p:nvSpPr>
+              <p:cNvPr id="12" name="Left Arrow 11">
+                <a:extLst>
+                  <a:ext uri="{FF2B5EF4-FFF2-40B4-BE49-F238E27FC236}">
+                    <a16:creationId xmlns:a16="http://schemas.microsoft.com/office/drawing/2014/main" id="{55C7925F-5BAC-A240-9A52-EBC73A85786A}"/>
+                  </a:ext>
+                </a:extLst>
+              </p:cNvPr>
+              <p:cNvSpPr/>
+              <p:nvPr/>
+            </p:nvSpPr>
+            <p:spPr>
+              <a:xfrm rot="10800000">
+                <a:off x="5847543" y="2906867"/>
+                <a:ext cx="1159099" cy="1070020"/>
+              </a:xfrm>
+              <a:prstGeom prst="leftArrow">
+                <a:avLst/>
+              </a:prstGeom>
+              <a:solidFill>
+                <a:schemeClr val="bg1"/>
+              </a:solidFill>
+              <a:ln>
+                <a:noFill/>
+              </a:ln>
+            </p:spPr>
+            <p:style>
+              <a:lnRef idx="2">
+                <a:schemeClr val="accent1">
+                  <a:shade val="50000"/>
+                </a:schemeClr>
+              </a:lnRef>
+              <a:fillRef idx="1">
+                <a:schemeClr val="accent1"/>
+              </a:fillRef>
+              <a:effectRef idx="0">
+                <a:schemeClr val="accent1"/>
+              </a:effectRef>
+              <a:fontRef idx="minor">
+                <a:schemeClr val="lt1"/>
+              </a:fontRef>
+            </p:style>
+            <p:txBody>
+              <a:bodyPr rtlCol="0" anchor="ctr"/>
+              <a:lstStyle/>
+              <a:p>
+                <a:pPr algn="ctr"/>
+                <a:endParaRPr lang="en-CH"/>
+              </a:p>
+            </p:txBody>
+          </p:sp>
+        </p:grpSp>
+      </p:grpSp>
+      <p:grpSp>
+        <p:nvGrpSpPr>
+          <p:cNvPr id="2" name="Group 1">
+            <a:extLst>
+              <a:ext uri="{FF2B5EF4-FFF2-40B4-BE49-F238E27FC236}">
+                <a16:creationId xmlns:a16="http://schemas.microsoft.com/office/drawing/2014/main" id="{E8BF0706-735D-C64E-95A1-1937134A563A}"/>
+              </a:ext>
+            </a:extLst>
+          </p:cNvPr>
+          <p:cNvGrpSpPr/>
+          <p:nvPr/>
+        </p:nvGrpSpPr>
+        <p:grpSpPr>
+          <a:xfrm>
+            <a:off x="3702138" y="1060899"/>
+            <a:ext cx="4610909" cy="2199067"/>
+            <a:chOff x="3702138" y="1060899"/>
+            <a:chExt cx="4610909" cy="2199067"/>
+          </a:xfrm>
+        </p:grpSpPr>
+        <p:sp>
+          <p:nvSpPr>
+            <p:cNvPr id="4" name="Rounded Rectangle 3">
+              <a:extLst>
+                <a:ext uri="{FF2B5EF4-FFF2-40B4-BE49-F238E27FC236}">
+                  <a16:creationId xmlns:a16="http://schemas.microsoft.com/office/drawing/2014/main" id="{41A930B9-7E38-CB47-9C41-AA2B1047897A}"/>
+                </a:ext>
+              </a:extLst>
+            </p:cNvPr>
+            <p:cNvSpPr/>
+            <p:nvPr/>
+          </p:nvSpPr>
+          <p:spPr>
+            <a:xfrm>
+              <a:off x="3702139" y="2199067"/>
+              <a:ext cx="2199067" cy="989530"/>
+            </a:xfrm>
+            <a:prstGeom prst="roundRect">
+              <a:avLst/>
+            </a:prstGeom>
+          </p:spPr>
+          <p:style>
+            <a:lnRef idx="2">
+              <a:schemeClr val="dk1">
+                <a:shade val="50000"/>
+              </a:schemeClr>
+            </a:lnRef>
+            <a:fillRef idx="1">
+              <a:schemeClr val="dk1"/>
+            </a:fillRef>
+            <a:effectRef idx="0">
+              <a:schemeClr val="dk1"/>
+            </a:effectRef>
+            <a:fontRef idx="minor">
+              <a:schemeClr val="lt1"/>
+            </a:fontRef>
+          </p:style>
+          <p:txBody>
+            <a:bodyPr rtlCol="0" anchor="ctr"/>
+            <a:lstStyle/>
+            <a:p>
+              <a:pPr algn="ctr"/>
+              <a:r>
+                <a:rPr lang="en-CH" sz="8800" dirty="0"/>
+                <a:t>A</a:t>
+              </a:r>
+              <a:endParaRPr lang="en-CH" sz="19900" dirty="0"/>
+            </a:p>
+          </p:txBody>
+        </p:sp>
+        <p:sp>
+          <p:nvSpPr>
+            <p:cNvPr id="22" name="Rounded Rectangle 21">
+              <a:extLst>
+                <a:ext uri="{FF2B5EF4-FFF2-40B4-BE49-F238E27FC236}">
+                  <a16:creationId xmlns:a16="http://schemas.microsoft.com/office/drawing/2014/main" id="{3A835BD3-7859-EB48-A8D7-BDCB3C3C0625}"/>
+                </a:ext>
+              </a:extLst>
+            </p:cNvPr>
+            <p:cNvSpPr/>
+            <p:nvPr/>
+          </p:nvSpPr>
+          <p:spPr>
+            <a:xfrm>
+              <a:off x="3702138" y="1060899"/>
+              <a:ext cx="2199067" cy="989530"/>
+            </a:xfrm>
+            <a:prstGeom prst="roundRect">
+              <a:avLst/>
+            </a:prstGeom>
+          </p:spPr>
+          <p:style>
+            <a:lnRef idx="2">
+              <a:schemeClr val="dk1">
+                <a:shade val="50000"/>
+              </a:schemeClr>
+            </a:lnRef>
+            <a:fillRef idx="1">
+              <a:schemeClr val="dk1"/>
+            </a:fillRef>
+            <a:effectRef idx="0">
+              <a:schemeClr val="dk1"/>
+            </a:effectRef>
+            <a:fontRef idx="minor">
+              <a:schemeClr val="lt1"/>
+            </a:fontRef>
+          </p:style>
+          <p:txBody>
+            <a:bodyPr rtlCol="0" anchor="ctr"/>
+            <a:lstStyle/>
+            <a:p>
+              <a:pPr algn="ctr"/>
+              <a:r>
+                <a:rPr lang="en-CH" sz="8800" dirty="0"/>
+                <a:t>Q</a:t>
+              </a:r>
+              <a:endParaRPr lang="en-CH" sz="19900" dirty="0"/>
+            </a:p>
+          </p:txBody>
+        </p:sp>
+        <p:sp>
+          <p:nvSpPr>
+            <p:cNvPr id="24" name="Rounded Rectangle 23">
+              <a:extLst>
+                <a:ext uri="{FF2B5EF4-FFF2-40B4-BE49-F238E27FC236}">
+                  <a16:creationId xmlns:a16="http://schemas.microsoft.com/office/drawing/2014/main" id="{ED72B0DE-2198-B349-8C3A-DAFFCFBF50C1}"/>
+                </a:ext>
+              </a:extLst>
+            </p:cNvPr>
+            <p:cNvSpPr/>
+            <p:nvPr/>
+          </p:nvSpPr>
+          <p:spPr>
+            <a:xfrm>
+              <a:off x="6113980" y="1060899"/>
+              <a:ext cx="2199067" cy="2199067"/>
+            </a:xfrm>
+            <a:prstGeom prst="roundRect">
+              <a:avLst/>
+            </a:prstGeom>
+          </p:spPr>
+          <p:style>
+            <a:lnRef idx="2">
+              <a:schemeClr val="dk1">
+                <a:shade val="50000"/>
+              </a:schemeClr>
+            </a:lnRef>
+            <a:fillRef idx="1">
+              <a:schemeClr val="dk1"/>
+            </a:fillRef>
+            <a:effectRef idx="0">
+              <a:schemeClr val="dk1"/>
+            </a:effectRef>
+            <a:fontRef idx="minor">
+              <a:schemeClr val="lt1"/>
+            </a:fontRef>
+          </p:style>
+          <p:txBody>
+            <a:bodyPr rtlCol="0" anchor="ctr"/>
+            <a:lstStyle/>
+            <a:p>
+              <a:pPr algn="ctr"/>
+              <a:r>
+                <a:rPr lang="en-CH" sz="13800" dirty="0"/>
+                <a:t>D</a:t>
+              </a:r>
+              <a:endParaRPr lang="en-CH" sz="19900" dirty="0"/>
+            </a:p>
+          </p:txBody>
+        </p:sp>
+      </p:grpSp>
+    </p:spTree>
+    <p:extLst>
+      <p:ext uri="{BB962C8B-B14F-4D97-AF65-F5344CB8AC3E}">
+        <p14:creationId xmlns:p14="http://schemas.microsoft.com/office/powerpoint/2010/main" val="2420761600"/>
+      </p:ext>
+    </p:extLst>
+  </p:cSld>
+  <p:clrMapOvr>
+    <a:masterClrMapping/>
+  </p:clrMapOvr>
+</p:sld>
+</file>
+
+<file path=ppt/slides/slide13.xml><?xml version="1.0" encoding="utf-8"?>
+<p:sld xmlns:a="http://schemas.openxmlformats.org/drawingml/2006/main" xmlns:r="http://schemas.openxmlformats.org/officeDocument/2006/relationships" xmlns:p="http://schemas.openxmlformats.org/presentationml/2006/main">
+  <p:cSld>
+    <p:spTree>
+      <p:nvGrpSpPr>
+        <p:cNvPr id="1" name=""/>
+        <p:cNvGrpSpPr/>
+        <p:nvPr/>
+      </p:nvGrpSpPr>
+      <p:grpSpPr>
+        <a:xfrm>
+          <a:off x="0" y="0"/>
+          <a:ext cx="0" cy="0"/>
+          <a:chOff x="0" y="0"/>
+          <a:chExt cx="0" cy="0"/>
+        </a:xfrm>
+      </p:grpSpPr>
+      <p:grpSp>
+        <p:nvGrpSpPr>
+          <p:cNvPr id="22" name="Group 21">
+            <a:extLst>
+              <a:ext uri="{FF2B5EF4-FFF2-40B4-BE49-F238E27FC236}">
+                <a16:creationId xmlns:a16="http://schemas.microsoft.com/office/drawing/2014/main" id="{E3AF0424-C9A9-E049-A705-5CBF923BE15F}"/>
+              </a:ext>
+            </a:extLst>
+          </p:cNvPr>
+          <p:cNvGrpSpPr/>
+          <p:nvPr/>
+        </p:nvGrpSpPr>
+        <p:grpSpPr>
+          <a:xfrm>
+            <a:off x="1867437" y="782121"/>
+            <a:ext cx="8474299" cy="5293759"/>
+            <a:chOff x="1867437" y="782121"/>
+            <a:chExt cx="8474299" cy="5293759"/>
+          </a:xfrm>
+        </p:grpSpPr>
+        <p:sp>
+          <p:nvSpPr>
+            <p:cNvPr id="21" name="Rounded Rectangle 20">
+              <a:extLst>
+                <a:ext uri="{FF2B5EF4-FFF2-40B4-BE49-F238E27FC236}">
+                  <a16:creationId xmlns:a16="http://schemas.microsoft.com/office/drawing/2014/main" id="{39CEC24F-4967-2645-AFFF-006797D752BC}"/>
+                </a:ext>
+              </a:extLst>
+            </p:cNvPr>
+            <p:cNvSpPr/>
+            <p:nvPr/>
+          </p:nvSpPr>
+          <p:spPr>
+            <a:xfrm>
+              <a:off x="1970468" y="782121"/>
+              <a:ext cx="8268236" cy="5293759"/>
+            </a:xfrm>
+            <a:prstGeom prst="roundRect">
+              <a:avLst/>
+            </a:prstGeom>
+            <a:gradFill flip="none" rotWithShape="1">
+              <a:gsLst>
+                <a:gs pos="0">
+                  <a:srgbClr val="92D050">
+                    <a:tint val="66000"/>
+                    <a:satMod val="160000"/>
+                  </a:srgbClr>
+                </a:gs>
+                <a:gs pos="50000">
+                  <a:srgbClr val="92D050">
+                    <a:tint val="44500"/>
+                    <a:satMod val="160000"/>
+                  </a:srgbClr>
+                </a:gs>
+                <a:gs pos="100000">
+                  <a:srgbClr val="92D050">
+                    <a:tint val="23500"/>
+                    <a:satMod val="160000"/>
+                  </a:srgbClr>
+                </a:gs>
+              </a:gsLst>
+              <a:lin ang="5400000" scaled="1"/>
+              <a:tileRect/>
+            </a:gradFill>
+          </p:spPr>
+          <p:style>
+            <a:lnRef idx="2">
+              <a:schemeClr val="accent6">
+                <a:shade val="50000"/>
+              </a:schemeClr>
+            </a:lnRef>
+            <a:fillRef idx="1">
+              <a:schemeClr val="accent6"/>
+            </a:fillRef>
+            <a:effectRef idx="0">
+              <a:schemeClr val="accent6"/>
+            </a:effectRef>
+            <a:fontRef idx="minor">
+              <a:schemeClr val="lt1"/>
+            </a:fontRef>
+          </p:style>
+          <p:txBody>
+            <a:bodyPr rtlCol="0" anchor="ctr"/>
+            <a:lstStyle/>
+            <a:p>
+              <a:pPr algn="ctr"/>
+              <a:endParaRPr lang="en-CH"/>
+            </a:p>
+          </p:txBody>
+        </p:sp>
+        <p:sp>
+          <p:nvSpPr>
+            <p:cNvPr id="6" name="Freeform 5">
+              <a:extLst>
+                <a:ext uri="{FF2B5EF4-FFF2-40B4-BE49-F238E27FC236}">
+                  <a16:creationId xmlns:a16="http://schemas.microsoft.com/office/drawing/2014/main" id="{1A2838F9-A221-D349-BDE9-4A2E7A5A7A4A}"/>
+                </a:ext>
+              </a:extLst>
+            </p:cNvPr>
+            <p:cNvSpPr/>
+            <p:nvPr/>
+          </p:nvSpPr>
+          <p:spPr>
+            <a:xfrm>
+              <a:off x="1867437" y="782122"/>
+              <a:ext cx="8474299" cy="5293758"/>
+            </a:xfrm>
+            <a:custGeom>
+              <a:avLst/>
+              <a:gdLst>
+                <a:gd name="connsiteX0" fmla="*/ 1163818 w 10470523"/>
+                <a:gd name="connsiteY0" fmla="*/ 104640 h 6117465"/>
+                <a:gd name="connsiteX1" fmla="*/ 179101 w 10470523"/>
+                <a:gd name="connsiteY1" fmla="*/ 1089357 h 6117465"/>
+                <a:gd name="connsiteX2" fmla="*/ 179101 w 10470523"/>
+                <a:gd name="connsiteY2" fmla="*/ 5028106 h 6117465"/>
+                <a:gd name="connsiteX3" fmla="*/ 1163818 w 10470523"/>
+                <a:gd name="connsiteY3" fmla="*/ 6012823 h 6117465"/>
+                <a:gd name="connsiteX4" fmla="*/ 9306704 w 10470523"/>
+                <a:gd name="connsiteY4" fmla="*/ 6012823 h 6117465"/>
+                <a:gd name="connsiteX5" fmla="*/ 10291421 w 10470523"/>
+                <a:gd name="connsiteY5" fmla="*/ 5028106 h 6117465"/>
+                <a:gd name="connsiteX6" fmla="*/ 10291421 w 10470523"/>
+                <a:gd name="connsiteY6" fmla="*/ 1089357 h 6117465"/>
+                <a:gd name="connsiteX7" fmla="*/ 9306704 w 10470523"/>
+                <a:gd name="connsiteY7" fmla="*/ 104640 h 6117465"/>
+                <a:gd name="connsiteX8" fmla="*/ 1019598 w 10470523"/>
+                <a:gd name="connsiteY8" fmla="*/ 0 h 6117465"/>
+                <a:gd name="connsiteX9" fmla="*/ 9450925 w 10470523"/>
+                <a:gd name="connsiteY9" fmla="*/ 0 h 6117465"/>
+                <a:gd name="connsiteX10" fmla="*/ 10470523 w 10470523"/>
+                <a:gd name="connsiteY10" fmla="*/ 1019598 h 6117465"/>
+                <a:gd name="connsiteX11" fmla="*/ 10470523 w 10470523"/>
+                <a:gd name="connsiteY11" fmla="*/ 5097867 h 6117465"/>
+                <a:gd name="connsiteX12" fmla="*/ 9450925 w 10470523"/>
+                <a:gd name="connsiteY12" fmla="*/ 6117465 h 6117465"/>
+                <a:gd name="connsiteX13" fmla="*/ 1019598 w 10470523"/>
+                <a:gd name="connsiteY13" fmla="*/ 6117465 h 6117465"/>
+                <a:gd name="connsiteX14" fmla="*/ 0 w 10470523"/>
+                <a:gd name="connsiteY14" fmla="*/ 5097867 h 6117465"/>
+                <a:gd name="connsiteX15" fmla="*/ 0 w 10470523"/>
+                <a:gd name="connsiteY15" fmla="*/ 1019598 h 6117465"/>
+                <a:gd name="connsiteX16" fmla="*/ 1019598 w 10470523"/>
+                <a:gd name="connsiteY16" fmla="*/ 0 h 6117465"/>
+              </a:gdLst>
+              <a:ahLst/>
+              <a:cxnLst>
+                <a:cxn ang="0">
+                  <a:pos x="connsiteX0" y="connsiteY0"/>
+                </a:cxn>
+                <a:cxn ang="0">
+                  <a:pos x="connsiteX1" y="connsiteY1"/>
+                </a:cxn>
+                <a:cxn ang="0">
+                  <a:pos x="connsiteX2" y="connsiteY2"/>
+                </a:cxn>
+                <a:cxn ang="0">
+                  <a:pos x="connsiteX3" y="connsiteY3"/>
+                </a:cxn>
+                <a:cxn ang="0">
+                  <a:pos x="connsiteX4" y="connsiteY4"/>
+                </a:cxn>
+                <a:cxn ang="0">
+                  <a:pos x="connsiteX5" y="connsiteY5"/>
+                </a:cxn>
+                <a:cxn ang="0">
+                  <a:pos x="connsiteX6" y="connsiteY6"/>
+                </a:cxn>
+                <a:cxn ang="0">
+                  <a:pos x="connsiteX7" y="connsiteY7"/>
+                </a:cxn>
+                <a:cxn ang="0">
+                  <a:pos x="connsiteX8" y="connsiteY8"/>
+                </a:cxn>
+                <a:cxn ang="0">
+                  <a:pos x="connsiteX9" y="connsiteY9"/>
+                </a:cxn>
+                <a:cxn ang="0">
+                  <a:pos x="connsiteX10" y="connsiteY10"/>
+                </a:cxn>
+                <a:cxn ang="0">
+                  <a:pos x="connsiteX11" y="connsiteY11"/>
+                </a:cxn>
+                <a:cxn ang="0">
+                  <a:pos x="connsiteX12" y="connsiteY12"/>
+                </a:cxn>
+                <a:cxn ang="0">
+                  <a:pos x="connsiteX13" y="connsiteY13"/>
+                </a:cxn>
+                <a:cxn ang="0">
+                  <a:pos x="connsiteX14" y="connsiteY14"/>
+                </a:cxn>
+                <a:cxn ang="0">
+                  <a:pos x="connsiteX15" y="connsiteY15"/>
+                </a:cxn>
+                <a:cxn ang="0">
+                  <a:pos x="connsiteX16" y="connsiteY16"/>
+                </a:cxn>
+              </a:cxnLst>
+              <a:rect l="l" t="t" r="r" b="b"/>
+              <a:pathLst>
+                <a:path w="10470523" h="6117465">
+                  <a:moveTo>
+                    <a:pt x="1163818" y="104640"/>
+                  </a:moveTo>
+                  <a:cubicBezTo>
+                    <a:pt x="619974" y="104640"/>
+                    <a:pt x="179101" y="545513"/>
+                    <a:pt x="179101" y="1089357"/>
+                  </a:cubicBezTo>
+                  <a:lnTo>
+                    <a:pt x="179101" y="5028106"/>
+                  </a:lnTo>
+                  <a:cubicBezTo>
+                    <a:pt x="179101" y="5571950"/>
+                    <a:pt x="619974" y="6012823"/>
+                    <a:pt x="1163818" y="6012823"/>
+                  </a:cubicBezTo>
+                  <a:lnTo>
+                    <a:pt x="9306704" y="6012823"/>
+                  </a:lnTo>
+                  <a:cubicBezTo>
+                    <a:pt x="9850548" y="6012823"/>
+                    <a:pt x="10291421" y="5571950"/>
+                    <a:pt x="10291421" y="5028106"/>
+                  </a:cubicBezTo>
+                  <a:lnTo>
+                    <a:pt x="10291421" y="1089357"/>
+                  </a:lnTo>
+                  <a:cubicBezTo>
+                    <a:pt x="10291421" y="545513"/>
+                    <a:pt x="9850548" y="104640"/>
+                    <a:pt x="9306704" y="104640"/>
+                  </a:cubicBezTo>
+                  <a:close/>
+                  <a:moveTo>
+                    <a:pt x="1019598" y="0"/>
+                  </a:moveTo>
+                  <a:lnTo>
+                    <a:pt x="9450925" y="0"/>
+                  </a:lnTo>
+                  <a:cubicBezTo>
+                    <a:pt x="10014033" y="0"/>
+                    <a:pt x="10470523" y="456490"/>
+                    <a:pt x="10470523" y="1019598"/>
+                  </a:cubicBezTo>
+                  <a:lnTo>
+                    <a:pt x="10470523" y="5097867"/>
+                  </a:lnTo>
+                  <a:cubicBezTo>
+                    <a:pt x="10470523" y="5660975"/>
+                    <a:pt x="10014033" y="6117465"/>
+                    <a:pt x="9450925" y="6117465"/>
+                  </a:cubicBezTo>
+                  <a:lnTo>
+                    <a:pt x="1019598" y="6117465"/>
+                  </a:lnTo>
+                  <a:cubicBezTo>
+                    <a:pt x="456490" y="6117465"/>
+                    <a:pt x="0" y="5660975"/>
+                    <a:pt x="0" y="5097867"/>
+                  </a:cubicBezTo>
+                  <a:lnTo>
+                    <a:pt x="0" y="1019598"/>
+                  </a:lnTo>
+                  <a:cubicBezTo>
+                    <a:pt x="0" y="456490"/>
+                    <a:pt x="456490" y="0"/>
+                    <a:pt x="1019598" y="0"/>
+                  </a:cubicBezTo>
+                  <a:close/>
+                </a:path>
+              </a:pathLst>
+            </a:custGeom>
+          </p:spPr>
+          <p:style>
+            <a:lnRef idx="2">
+              <a:schemeClr val="dk1">
+                <a:shade val="50000"/>
+              </a:schemeClr>
+            </a:lnRef>
+            <a:fillRef idx="1">
+              <a:schemeClr val="dk1"/>
+            </a:fillRef>
+            <a:effectRef idx="0">
+              <a:schemeClr val="dk1"/>
+            </a:effectRef>
+            <a:fontRef idx="minor">
+              <a:schemeClr val="lt1"/>
+            </a:fontRef>
+          </p:style>
+          <p:txBody>
+            <a:bodyPr rtlCol="0" anchor="ctr"/>
+            <a:lstStyle/>
+            <a:p>
+              <a:pPr algn="ctr"/>
+              <a:endParaRPr lang="en-CH"/>
+            </a:p>
+          </p:txBody>
+        </p:sp>
+        <p:sp>
+          <p:nvSpPr>
+            <p:cNvPr id="7" name="TextBox 6">
+              <a:extLst>
+                <a:ext uri="{FF2B5EF4-FFF2-40B4-BE49-F238E27FC236}">
+                  <a16:creationId xmlns:a16="http://schemas.microsoft.com/office/drawing/2014/main" id="{97BDA206-E3D5-B149-BAC4-4DA8A5351E03}"/>
+                </a:ext>
+              </a:extLst>
+            </p:cNvPr>
+            <p:cNvSpPr txBox="1"/>
+            <p:nvPr/>
+          </p:nvSpPr>
+          <p:spPr>
+            <a:xfrm>
+              <a:off x="2180855" y="782121"/>
+              <a:ext cx="7830285" cy="2646878"/>
+            </a:xfrm>
+            <a:prstGeom prst="rect">
+              <a:avLst/>
+            </a:prstGeom>
+            <a:noFill/>
+          </p:spPr>
+          <p:txBody>
+            <a:bodyPr wrap="none" rtlCol="0">
+              <a:spAutoFit/>
+            </a:bodyPr>
+            <a:lstStyle/>
+            <a:p>
+              <a:r>
+                <a:rPr lang="en-CH" sz="16600" dirty="0">
+                  <a:latin typeface="Cooper Black" panose="0208090404030B020404" pitchFamily="18" charset="77"/>
+                </a:rPr>
+                <a:t>Electr  </a:t>
+              </a:r>
+            </a:p>
+          </p:txBody>
+        </p:sp>
+        <p:sp>
+          <p:nvSpPr>
+            <p:cNvPr id="8" name="TextBox 7">
+              <a:extLst>
+                <a:ext uri="{FF2B5EF4-FFF2-40B4-BE49-F238E27FC236}">
+                  <a16:creationId xmlns:a16="http://schemas.microsoft.com/office/drawing/2014/main" id="{FDD8F743-ED4A-6647-B30C-3E4C061D08DE}"/>
+                </a:ext>
+              </a:extLst>
+            </p:cNvPr>
+            <p:cNvSpPr txBox="1"/>
+            <p:nvPr/>
+          </p:nvSpPr>
+          <p:spPr>
+            <a:xfrm>
+              <a:off x="3414012" y="3201472"/>
+              <a:ext cx="5363969" cy="2646878"/>
+            </a:xfrm>
+            <a:prstGeom prst="rect">
+              <a:avLst/>
+            </a:prstGeom>
+            <a:noFill/>
+          </p:spPr>
+          <p:txBody>
+            <a:bodyPr wrap="none" rtlCol="0">
+              <a:spAutoFit/>
+            </a:bodyPr>
+            <a:lstStyle/>
+            <a:p>
+              <a:r>
+                <a:rPr lang="en-CH" sz="16600" dirty="0">
+                  <a:latin typeface="Cooper Black" panose="0208090404030B020404" pitchFamily="18" charset="77"/>
+                </a:rPr>
+                <a:t>P  ng</a:t>
+              </a:r>
+            </a:p>
+          </p:txBody>
+        </p:sp>
+        <p:grpSp>
+          <p:nvGrpSpPr>
+            <p:cNvPr id="9" name="Group 8">
+              <a:extLst>
+                <a:ext uri="{FF2B5EF4-FFF2-40B4-BE49-F238E27FC236}">
+                  <a16:creationId xmlns:a16="http://schemas.microsoft.com/office/drawing/2014/main" id="{74B43CD5-8414-524B-9FFF-56AE2680F490}"/>
+                </a:ext>
+              </a:extLst>
+            </p:cNvPr>
+            <p:cNvGrpSpPr/>
+            <p:nvPr/>
+          </p:nvGrpSpPr>
+          <p:grpSpPr>
+            <a:xfrm>
+              <a:off x="8916435" y="1777283"/>
+              <a:ext cx="1094705" cy="1094705"/>
+              <a:chOff x="3964546" y="1297546"/>
+              <a:chExt cx="4262908" cy="4262908"/>
+            </a:xfrm>
+          </p:grpSpPr>
+          <p:sp>
+            <p:nvSpPr>
+              <p:cNvPr id="10" name="Oval 9">
+                <a:extLst>
+                  <a:ext uri="{FF2B5EF4-FFF2-40B4-BE49-F238E27FC236}">
+                    <a16:creationId xmlns:a16="http://schemas.microsoft.com/office/drawing/2014/main" id="{D0AEC892-EE52-DC4C-BEF4-F4692D5356C3}"/>
+                  </a:ext>
+                </a:extLst>
+              </p:cNvPr>
+              <p:cNvSpPr/>
+              <p:nvPr/>
+            </p:nvSpPr>
+            <p:spPr>
+              <a:xfrm>
+                <a:off x="4125531" y="1458531"/>
+                <a:ext cx="3940937" cy="3940937"/>
+              </a:xfrm>
+              <a:prstGeom prst="ellipse">
+                <a:avLst/>
+              </a:prstGeom>
+              <a:solidFill>
+                <a:srgbClr val="C00000">
+                  <a:alpha val="29804"/>
+                </a:srgbClr>
+              </a:solidFill>
+              <a:ln>
+                <a:noFill/>
+              </a:ln>
+            </p:spPr>
+            <p:style>
+              <a:lnRef idx="2">
+                <a:schemeClr val="accent4">
+                  <a:shade val="50000"/>
+                </a:schemeClr>
+              </a:lnRef>
+              <a:fillRef idx="1">
+                <a:schemeClr val="accent4"/>
+              </a:fillRef>
+              <a:effectRef idx="0">
+                <a:schemeClr val="accent4"/>
+              </a:effectRef>
+              <a:fontRef idx="minor">
+                <a:schemeClr val="lt1"/>
+              </a:fontRef>
+            </p:style>
+            <p:txBody>
+              <a:bodyPr rtlCol="0" anchor="ctr"/>
+              <a:lstStyle/>
+              <a:p>
+                <a:pPr algn="ctr"/>
+                <a:endParaRPr lang="en-CH"/>
+              </a:p>
+            </p:txBody>
+          </p:sp>
+          <p:sp>
+            <p:nvSpPr>
+              <p:cNvPr id="11" name="Freeform 10">
+                <a:extLst>
+                  <a:ext uri="{FF2B5EF4-FFF2-40B4-BE49-F238E27FC236}">
+                    <a16:creationId xmlns:a16="http://schemas.microsoft.com/office/drawing/2014/main" id="{351756A8-5D20-584B-8E02-0F9921905EA2}"/>
+                  </a:ext>
+                </a:extLst>
+              </p:cNvPr>
+              <p:cNvSpPr/>
+              <p:nvPr/>
+            </p:nvSpPr>
+            <p:spPr>
+              <a:xfrm>
+                <a:off x="3964546" y="1297546"/>
+                <a:ext cx="4262908" cy="4262908"/>
+              </a:xfrm>
+              <a:custGeom>
+                <a:avLst/>
+                <a:gdLst>
+                  <a:gd name="connsiteX0" fmla="*/ 2131453 w 4262908"/>
+                  <a:gd name="connsiteY0" fmla="*/ 192645 h 4262908"/>
+                  <a:gd name="connsiteX1" fmla="*/ 239217 w 4262908"/>
+                  <a:gd name="connsiteY1" fmla="*/ 2131453 h 4262908"/>
+                  <a:gd name="connsiteX2" fmla="*/ 2131453 w 4262908"/>
+                  <a:gd name="connsiteY2" fmla="*/ 4070261 h 4262908"/>
+                  <a:gd name="connsiteX3" fmla="*/ 4023689 w 4262908"/>
+                  <a:gd name="connsiteY3" fmla="*/ 2131453 h 4262908"/>
+                  <a:gd name="connsiteX4" fmla="*/ 2131453 w 4262908"/>
+                  <a:gd name="connsiteY4" fmla="*/ 192645 h 4262908"/>
+                  <a:gd name="connsiteX5" fmla="*/ 2131454 w 4262908"/>
+                  <a:gd name="connsiteY5" fmla="*/ 0 h 4262908"/>
+                  <a:gd name="connsiteX6" fmla="*/ 4262908 w 4262908"/>
+                  <a:gd name="connsiteY6" fmla="*/ 2131454 h 4262908"/>
+                  <a:gd name="connsiteX7" fmla="*/ 2131454 w 4262908"/>
+                  <a:gd name="connsiteY7" fmla="*/ 4262908 h 4262908"/>
+                  <a:gd name="connsiteX8" fmla="*/ 0 w 4262908"/>
+                  <a:gd name="connsiteY8" fmla="*/ 2131454 h 4262908"/>
+                  <a:gd name="connsiteX9" fmla="*/ 2131454 w 4262908"/>
+                  <a:gd name="connsiteY9" fmla="*/ 0 h 4262908"/>
+                </a:gdLst>
+                <a:ahLst/>
+                <a:cxnLst>
+                  <a:cxn ang="0">
+                    <a:pos x="connsiteX0" y="connsiteY0"/>
+                  </a:cxn>
+                  <a:cxn ang="0">
+                    <a:pos x="connsiteX1" y="connsiteY1"/>
+                  </a:cxn>
+                  <a:cxn ang="0">
+                    <a:pos x="connsiteX2" y="connsiteY2"/>
+                  </a:cxn>
+                  <a:cxn ang="0">
+                    <a:pos x="connsiteX3" y="connsiteY3"/>
+                  </a:cxn>
+                  <a:cxn ang="0">
+                    <a:pos x="connsiteX4" y="connsiteY4"/>
+                  </a:cxn>
+                  <a:cxn ang="0">
+                    <a:pos x="connsiteX5" y="connsiteY5"/>
+                  </a:cxn>
+                  <a:cxn ang="0">
+                    <a:pos x="connsiteX6" y="connsiteY6"/>
+                  </a:cxn>
+                  <a:cxn ang="0">
+                    <a:pos x="connsiteX7" y="connsiteY7"/>
+                  </a:cxn>
+                  <a:cxn ang="0">
+                    <a:pos x="connsiteX8" y="connsiteY8"/>
+                  </a:cxn>
+                  <a:cxn ang="0">
+                    <a:pos x="connsiteX9" y="connsiteY9"/>
+                  </a:cxn>
+                </a:cxnLst>
+                <a:rect l="l" t="t" r="r" b="b"/>
+                <a:pathLst>
+                  <a:path w="4262908" h="4262908">
+                    <a:moveTo>
+                      <a:pt x="2131453" y="192645"/>
+                    </a:moveTo>
+                    <a:cubicBezTo>
+                      <a:pt x="1086400" y="192645"/>
+                      <a:pt x="239217" y="1060679"/>
+                      <a:pt x="239217" y="2131453"/>
+                    </a:cubicBezTo>
+                    <a:cubicBezTo>
+                      <a:pt x="239217" y="3202227"/>
+                      <a:pt x="1086400" y="4070261"/>
+                      <a:pt x="2131453" y="4070261"/>
+                    </a:cubicBezTo>
+                    <a:cubicBezTo>
+                      <a:pt x="3176506" y="4070261"/>
+                      <a:pt x="4023689" y="3202227"/>
+                      <a:pt x="4023689" y="2131453"/>
+                    </a:cubicBezTo>
+                    <a:cubicBezTo>
+                      <a:pt x="4023689" y="1060679"/>
+                      <a:pt x="3176506" y="192645"/>
+                      <a:pt x="2131453" y="192645"/>
+                    </a:cubicBezTo>
+                    <a:close/>
+                    <a:moveTo>
+                      <a:pt x="2131454" y="0"/>
+                    </a:moveTo>
+                    <a:cubicBezTo>
+                      <a:pt x="3308624" y="0"/>
+                      <a:pt x="4262908" y="954284"/>
+                      <a:pt x="4262908" y="2131454"/>
+                    </a:cubicBezTo>
+                    <a:cubicBezTo>
+                      <a:pt x="4262908" y="3308624"/>
+                      <a:pt x="3308624" y="4262908"/>
+                      <a:pt x="2131454" y="4262908"/>
+                    </a:cubicBezTo>
+                    <a:cubicBezTo>
+                      <a:pt x="954284" y="4262908"/>
+                      <a:pt x="0" y="3308624"/>
+                      <a:pt x="0" y="2131454"/>
+                    </a:cubicBezTo>
+                    <a:cubicBezTo>
+                      <a:pt x="0" y="954284"/>
+                      <a:pt x="954284" y="0"/>
+                      <a:pt x="2131454" y="0"/>
+                    </a:cubicBezTo>
+                    <a:close/>
+                  </a:path>
+                </a:pathLst>
+              </a:custGeom>
+            </p:spPr>
+            <p:style>
+              <a:lnRef idx="2">
+                <a:schemeClr val="dk1">
+                  <a:shade val="50000"/>
+                </a:schemeClr>
+              </a:lnRef>
+              <a:fillRef idx="1">
+                <a:schemeClr val="dk1"/>
+              </a:fillRef>
+              <a:effectRef idx="0">
+                <a:schemeClr val="dk1"/>
+              </a:effectRef>
+              <a:fontRef idx="minor">
+                <a:schemeClr val="lt1"/>
+              </a:fontRef>
+            </p:style>
+            <p:txBody>
+              <a:bodyPr rtlCol="0" anchor="ctr"/>
+              <a:lstStyle/>
+              <a:p>
+                <a:pPr algn="ctr"/>
+                <a:endParaRPr lang="en-CH"/>
+              </a:p>
+            </p:txBody>
+          </p:sp>
+          <p:sp>
+            <p:nvSpPr>
+              <p:cNvPr id="12" name="Rectangle 11">
+                <a:extLst>
+                  <a:ext uri="{FF2B5EF4-FFF2-40B4-BE49-F238E27FC236}">
+                    <a16:creationId xmlns:a16="http://schemas.microsoft.com/office/drawing/2014/main" id="{69B6B202-B76B-8446-B74B-7219118D0042}"/>
+                  </a:ext>
+                </a:extLst>
+              </p:cNvPr>
+              <p:cNvSpPr/>
+              <p:nvPr/>
+            </p:nvSpPr>
+            <p:spPr>
+              <a:xfrm>
+                <a:off x="4550535" y="3280893"/>
+                <a:ext cx="3090930" cy="296214"/>
+              </a:xfrm>
+              <a:prstGeom prst="rect">
+                <a:avLst/>
+              </a:prstGeom>
+            </p:spPr>
+            <p:style>
+              <a:lnRef idx="2">
+                <a:schemeClr val="dk1">
+                  <a:shade val="50000"/>
+                </a:schemeClr>
+              </a:lnRef>
+              <a:fillRef idx="1">
+                <a:schemeClr val="dk1"/>
+              </a:fillRef>
+              <a:effectRef idx="0">
+                <a:schemeClr val="dk1"/>
+              </a:effectRef>
+              <a:fontRef idx="minor">
+                <a:schemeClr val="lt1"/>
+              </a:fontRef>
+            </p:style>
+            <p:txBody>
+              <a:bodyPr rtlCol="0" anchor="ctr"/>
+              <a:lstStyle/>
+              <a:p>
+                <a:pPr algn="ctr"/>
+                <a:endParaRPr lang="en-CH"/>
+              </a:p>
+            </p:txBody>
+          </p:sp>
+          <p:sp>
+            <p:nvSpPr>
+              <p:cNvPr id="13" name="Rectangle 12">
+                <a:extLst>
+                  <a:ext uri="{FF2B5EF4-FFF2-40B4-BE49-F238E27FC236}">
+                    <a16:creationId xmlns:a16="http://schemas.microsoft.com/office/drawing/2014/main" id="{521702E1-BF63-1342-BD78-7C76FAAA9018}"/>
+                  </a:ext>
+                </a:extLst>
+              </p:cNvPr>
+              <p:cNvSpPr/>
+              <p:nvPr/>
+            </p:nvSpPr>
+            <p:spPr>
+              <a:xfrm rot="5400000">
+                <a:off x="4550535" y="3280893"/>
+                <a:ext cx="3090930" cy="296214"/>
+              </a:xfrm>
+              <a:prstGeom prst="rect">
+                <a:avLst/>
+              </a:prstGeom>
+            </p:spPr>
+            <p:style>
+              <a:lnRef idx="2">
+                <a:schemeClr val="dk1">
+                  <a:shade val="50000"/>
+                </a:schemeClr>
+              </a:lnRef>
+              <a:fillRef idx="1">
+                <a:schemeClr val="dk1"/>
+              </a:fillRef>
+              <a:effectRef idx="0">
+                <a:schemeClr val="dk1"/>
+              </a:effectRef>
+              <a:fontRef idx="minor">
+                <a:schemeClr val="lt1"/>
+              </a:fontRef>
+            </p:style>
+            <p:txBody>
+              <a:bodyPr rtlCol="0" anchor="ctr"/>
+              <a:lstStyle/>
+              <a:p>
+                <a:pPr algn="ctr"/>
+                <a:endParaRPr lang="en-CH"/>
+              </a:p>
+            </p:txBody>
+          </p:sp>
+        </p:grpSp>
+        <p:grpSp>
+          <p:nvGrpSpPr>
+            <p:cNvPr id="14" name="Group 13">
+              <a:extLst>
+                <a:ext uri="{FF2B5EF4-FFF2-40B4-BE49-F238E27FC236}">
+                  <a16:creationId xmlns:a16="http://schemas.microsoft.com/office/drawing/2014/main" id="{9BF69BF4-0A54-C440-82E8-537CB6D4FD89}"/>
+                </a:ext>
+              </a:extLst>
+            </p:cNvPr>
+            <p:cNvGrpSpPr/>
+            <p:nvPr/>
+          </p:nvGrpSpPr>
+          <p:grpSpPr>
+            <a:xfrm>
+              <a:off x="4849969" y="4230438"/>
+              <a:ext cx="1114295" cy="1114295"/>
+              <a:chOff x="3964546" y="1297546"/>
+              <a:chExt cx="4262908" cy="4262908"/>
+            </a:xfrm>
+          </p:grpSpPr>
+          <p:sp>
+            <p:nvSpPr>
+              <p:cNvPr id="15" name="Oval 14">
+                <a:extLst>
+                  <a:ext uri="{FF2B5EF4-FFF2-40B4-BE49-F238E27FC236}">
+                    <a16:creationId xmlns:a16="http://schemas.microsoft.com/office/drawing/2014/main" id="{4C74A00F-313A-8A4F-87FE-AEDCE37F7A5F}"/>
+                  </a:ext>
+                </a:extLst>
+              </p:cNvPr>
+              <p:cNvSpPr/>
+              <p:nvPr/>
+            </p:nvSpPr>
+            <p:spPr>
+              <a:xfrm>
+                <a:off x="4125531" y="1458531"/>
+                <a:ext cx="3940937" cy="3940937"/>
+              </a:xfrm>
+              <a:prstGeom prst="ellipse">
+                <a:avLst/>
+              </a:prstGeom>
+              <a:solidFill>
+                <a:schemeClr val="accent1">
+                  <a:lumMod val="60000"/>
+                  <a:lumOff val="40000"/>
+                  <a:alpha val="29804"/>
+                </a:schemeClr>
+              </a:solidFill>
+              <a:ln>
+                <a:noFill/>
+              </a:ln>
+            </p:spPr>
+            <p:style>
+              <a:lnRef idx="2">
+                <a:schemeClr val="accent4">
+                  <a:shade val="50000"/>
+                </a:schemeClr>
+              </a:lnRef>
+              <a:fillRef idx="1">
+                <a:schemeClr val="accent4"/>
+              </a:fillRef>
+              <a:effectRef idx="0">
+                <a:schemeClr val="accent4"/>
+              </a:effectRef>
+              <a:fontRef idx="minor">
+                <a:schemeClr val="lt1"/>
+              </a:fontRef>
+            </p:style>
+            <p:txBody>
+              <a:bodyPr rtlCol="0" anchor="ctr"/>
+              <a:lstStyle/>
+              <a:p>
+                <a:pPr algn="ctr"/>
+                <a:endParaRPr lang="en-CH"/>
+              </a:p>
+            </p:txBody>
+          </p:sp>
+          <p:sp>
+            <p:nvSpPr>
+              <p:cNvPr id="16" name="Freeform 15">
+                <a:extLst>
+                  <a:ext uri="{FF2B5EF4-FFF2-40B4-BE49-F238E27FC236}">
+                    <a16:creationId xmlns:a16="http://schemas.microsoft.com/office/drawing/2014/main" id="{21D648B5-F901-EF44-9BB8-2AB200919172}"/>
+                  </a:ext>
+                </a:extLst>
+              </p:cNvPr>
+              <p:cNvSpPr/>
+              <p:nvPr/>
+            </p:nvSpPr>
+            <p:spPr>
+              <a:xfrm>
+                <a:off x="3964546" y="1297546"/>
+                <a:ext cx="4262908" cy="4262908"/>
+              </a:xfrm>
+              <a:custGeom>
+                <a:avLst/>
+                <a:gdLst>
+                  <a:gd name="connsiteX0" fmla="*/ 2131453 w 4262908"/>
+                  <a:gd name="connsiteY0" fmla="*/ 192645 h 4262908"/>
+                  <a:gd name="connsiteX1" fmla="*/ 239217 w 4262908"/>
+                  <a:gd name="connsiteY1" fmla="*/ 2131453 h 4262908"/>
+                  <a:gd name="connsiteX2" fmla="*/ 2131453 w 4262908"/>
+                  <a:gd name="connsiteY2" fmla="*/ 4070261 h 4262908"/>
+                  <a:gd name="connsiteX3" fmla="*/ 4023689 w 4262908"/>
+                  <a:gd name="connsiteY3" fmla="*/ 2131453 h 4262908"/>
+                  <a:gd name="connsiteX4" fmla="*/ 2131453 w 4262908"/>
+                  <a:gd name="connsiteY4" fmla="*/ 192645 h 4262908"/>
+                  <a:gd name="connsiteX5" fmla="*/ 2131454 w 4262908"/>
+                  <a:gd name="connsiteY5" fmla="*/ 0 h 4262908"/>
+                  <a:gd name="connsiteX6" fmla="*/ 4262908 w 4262908"/>
+                  <a:gd name="connsiteY6" fmla="*/ 2131454 h 4262908"/>
+                  <a:gd name="connsiteX7" fmla="*/ 2131454 w 4262908"/>
+                  <a:gd name="connsiteY7" fmla="*/ 4262908 h 4262908"/>
+                  <a:gd name="connsiteX8" fmla="*/ 0 w 4262908"/>
+                  <a:gd name="connsiteY8" fmla="*/ 2131454 h 4262908"/>
+                  <a:gd name="connsiteX9" fmla="*/ 2131454 w 4262908"/>
+                  <a:gd name="connsiteY9" fmla="*/ 0 h 4262908"/>
+                </a:gdLst>
+                <a:ahLst/>
+                <a:cxnLst>
+                  <a:cxn ang="0">
+                    <a:pos x="connsiteX0" y="connsiteY0"/>
+                  </a:cxn>
+                  <a:cxn ang="0">
+                    <a:pos x="connsiteX1" y="connsiteY1"/>
+                  </a:cxn>
+                  <a:cxn ang="0">
+                    <a:pos x="connsiteX2" y="connsiteY2"/>
+                  </a:cxn>
+                  <a:cxn ang="0">
+                    <a:pos x="connsiteX3" y="connsiteY3"/>
+                  </a:cxn>
+                  <a:cxn ang="0">
+                    <a:pos x="connsiteX4" y="connsiteY4"/>
+                  </a:cxn>
+                  <a:cxn ang="0">
+                    <a:pos x="connsiteX5" y="connsiteY5"/>
+                  </a:cxn>
+                  <a:cxn ang="0">
+                    <a:pos x="connsiteX6" y="connsiteY6"/>
+                  </a:cxn>
+                  <a:cxn ang="0">
+                    <a:pos x="connsiteX7" y="connsiteY7"/>
+                  </a:cxn>
+                  <a:cxn ang="0">
+                    <a:pos x="connsiteX8" y="connsiteY8"/>
+                  </a:cxn>
+                  <a:cxn ang="0">
+                    <a:pos x="connsiteX9" y="connsiteY9"/>
+                  </a:cxn>
+                </a:cxnLst>
+                <a:rect l="l" t="t" r="r" b="b"/>
+                <a:pathLst>
+                  <a:path w="4262908" h="4262908">
+                    <a:moveTo>
+                      <a:pt x="2131453" y="192645"/>
+                    </a:moveTo>
+                    <a:cubicBezTo>
+                      <a:pt x="1086400" y="192645"/>
+                      <a:pt x="239217" y="1060679"/>
+                      <a:pt x="239217" y="2131453"/>
+                    </a:cubicBezTo>
+                    <a:cubicBezTo>
+                      <a:pt x="239217" y="3202227"/>
+                      <a:pt x="1086400" y="4070261"/>
+                      <a:pt x="2131453" y="4070261"/>
+                    </a:cubicBezTo>
+                    <a:cubicBezTo>
+                      <a:pt x="3176506" y="4070261"/>
+                      <a:pt x="4023689" y="3202227"/>
+                      <a:pt x="4023689" y="2131453"/>
+                    </a:cubicBezTo>
+                    <a:cubicBezTo>
+                      <a:pt x="4023689" y="1060679"/>
+                      <a:pt x="3176506" y="192645"/>
+                      <a:pt x="2131453" y="192645"/>
+                    </a:cubicBezTo>
+                    <a:close/>
+                    <a:moveTo>
+                      <a:pt x="2131454" y="0"/>
+                    </a:moveTo>
+                    <a:cubicBezTo>
+                      <a:pt x="3308624" y="0"/>
+                      <a:pt x="4262908" y="954284"/>
+                      <a:pt x="4262908" y="2131454"/>
+                    </a:cubicBezTo>
+                    <a:cubicBezTo>
+                      <a:pt x="4262908" y="3308624"/>
+                      <a:pt x="3308624" y="4262908"/>
+                      <a:pt x="2131454" y="4262908"/>
+                    </a:cubicBezTo>
+                    <a:cubicBezTo>
+                      <a:pt x="954284" y="4262908"/>
+                      <a:pt x="0" y="3308624"/>
+                      <a:pt x="0" y="2131454"/>
+                    </a:cubicBezTo>
+                    <a:cubicBezTo>
+                      <a:pt x="0" y="954284"/>
+                      <a:pt x="954284" y="0"/>
+                      <a:pt x="2131454" y="0"/>
+                    </a:cubicBezTo>
+                    <a:close/>
+                  </a:path>
+                </a:pathLst>
+              </a:custGeom>
+            </p:spPr>
+            <p:style>
+              <a:lnRef idx="2">
+                <a:schemeClr val="dk1">
+                  <a:shade val="50000"/>
+                </a:schemeClr>
+              </a:lnRef>
+              <a:fillRef idx="1">
+                <a:schemeClr val="dk1"/>
+              </a:fillRef>
+              <a:effectRef idx="0">
+                <a:schemeClr val="dk1"/>
+              </a:effectRef>
+              <a:fontRef idx="minor">
+                <a:schemeClr val="lt1"/>
+              </a:fontRef>
+            </p:style>
+            <p:txBody>
+              <a:bodyPr rtlCol="0" anchor="ctr"/>
+              <a:lstStyle/>
+              <a:p>
+                <a:pPr algn="ctr"/>
+                <a:endParaRPr lang="en-CH"/>
+              </a:p>
+            </p:txBody>
+          </p:sp>
+          <p:sp>
+            <p:nvSpPr>
+              <p:cNvPr id="17" name="Rectangle 16">
+                <a:extLst>
+                  <a:ext uri="{FF2B5EF4-FFF2-40B4-BE49-F238E27FC236}">
+                    <a16:creationId xmlns:a16="http://schemas.microsoft.com/office/drawing/2014/main" id="{A831846B-F910-0B4E-BECD-CAD75354443A}"/>
+                  </a:ext>
+                </a:extLst>
+              </p:cNvPr>
+              <p:cNvSpPr/>
+              <p:nvPr/>
+            </p:nvSpPr>
+            <p:spPr>
+              <a:xfrm>
+                <a:off x="4550535" y="3280893"/>
+                <a:ext cx="3090930" cy="296214"/>
+              </a:xfrm>
+              <a:prstGeom prst="rect">
+                <a:avLst/>
+              </a:prstGeom>
+            </p:spPr>
+            <p:style>
+              <a:lnRef idx="2">
+                <a:schemeClr val="dk1">
+                  <a:shade val="50000"/>
+                </a:schemeClr>
+              </a:lnRef>
+              <a:fillRef idx="1">
+                <a:schemeClr val="dk1"/>
+              </a:fillRef>
+              <a:effectRef idx="0">
+                <a:schemeClr val="dk1"/>
+              </a:effectRef>
+              <a:fontRef idx="minor">
+                <a:schemeClr val="lt1"/>
+              </a:fontRef>
+            </p:style>
+            <p:txBody>
+              <a:bodyPr rtlCol="0" anchor="ctr"/>
+              <a:lstStyle/>
+              <a:p>
+                <a:pPr algn="ctr"/>
+                <a:endParaRPr lang="en-CH"/>
+              </a:p>
+            </p:txBody>
+          </p:sp>
+        </p:grpSp>
+        <p:sp>
+          <p:nvSpPr>
+            <p:cNvPr id="20" name="Right Arrow 19">
+              <a:extLst>
+                <a:ext uri="{FF2B5EF4-FFF2-40B4-BE49-F238E27FC236}">
+                  <a16:creationId xmlns:a16="http://schemas.microsoft.com/office/drawing/2014/main" id="{16F75195-C557-9241-91E7-1C95E001D9D3}"/>
+                </a:ext>
+              </a:extLst>
+            </p:cNvPr>
+            <p:cNvSpPr/>
+            <p:nvPr/>
+          </p:nvSpPr>
+          <p:spPr>
+            <a:xfrm>
+              <a:off x="2180856" y="2973942"/>
+              <a:ext cx="6735579" cy="323050"/>
+            </a:xfrm>
+            <a:prstGeom prst="rightArrow">
+              <a:avLst/>
+            </a:prstGeom>
+          </p:spPr>
+          <p:style>
+            <a:lnRef idx="2">
+              <a:schemeClr val="dk1">
+                <a:shade val="50000"/>
+              </a:schemeClr>
+            </a:lnRef>
+            <a:fillRef idx="1">
+              <a:schemeClr val="dk1"/>
+            </a:fillRef>
+            <a:effectRef idx="0">
+              <a:schemeClr val="dk1"/>
+            </a:effectRef>
+            <a:fontRef idx="minor">
+              <a:schemeClr val="lt1"/>
+            </a:fontRef>
+          </p:style>
+          <p:txBody>
+            <a:bodyPr rtlCol="0" anchor="ctr"/>
+            <a:lstStyle/>
+            <a:p>
+              <a:pPr algn="ctr"/>
+              <a:endParaRPr lang="en-CH"/>
+            </a:p>
+          </p:txBody>
+        </p:sp>
+      </p:grpSp>
+    </p:spTree>
+    <p:extLst>
+      <p:ext uri="{BB962C8B-B14F-4D97-AF65-F5344CB8AC3E}">
+        <p14:creationId xmlns:p14="http://schemas.microsoft.com/office/powerpoint/2010/main" val="1137217286"/>
+      </p:ext>
+    </p:extLst>
+  </p:cSld>
+  <p:clrMapOvr>
+    <a:masterClrMapping/>
+  </p:clrMapOvr>
+</p:sld>
+</file>
+
+<file path=ppt/slides/slide14.xml><?xml version="1.0" encoding="utf-8"?>
+<p:sld xmlns:a="http://schemas.openxmlformats.org/drawingml/2006/main" xmlns:r="http://schemas.openxmlformats.org/officeDocument/2006/relationships" xmlns:p="http://schemas.openxmlformats.org/presentationml/2006/main">
+  <p:cSld>
+    <p:spTree>
+      <p:nvGrpSpPr>
+        <p:cNvPr id="1" name=""/>
+        <p:cNvGrpSpPr/>
+        <p:nvPr/>
+      </p:nvGrpSpPr>
+      <p:grpSpPr>
+        <a:xfrm>
+          <a:off x="0" y="0"/>
+          <a:ext cx="0" cy="0"/>
+          <a:chOff x="0" y="0"/>
+          <a:chExt cx="0" cy="0"/>
+        </a:xfrm>
+      </p:grpSpPr>
+      <p:grpSp>
+        <p:nvGrpSpPr>
+          <p:cNvPr id="13" name="Group 12">
+            <a:extLst>
+              <a:ext uri="{FF2B5EF4-FFF2-40B4-BE49-F238E27FC236}">
+                <a16:creationId xmlns:a16="http://schemas.microsoft.com/office/drawing/2014/main" id="{8D392812-EE3C-004B-A839-FAFB2FE4EC17}"/>
+              </a:ext>
+            </a:extLst>
+          </p:cNvPr>
+          <p:cNvGrpSpPr/>
+          <p:nvPr/>
+        </p:nvGrpSpPr>
+        <p:grpSpPr>
+          <a:xfrm>
+            <a:off x="2503604" y="241211"/>
+            <a:ext cx="3970248" cy="5122055"/>
+            <a:chOff x="2503604" y="241211"/>
+            <a:chExt cx="3970248" cy="5122055"/>
+          </a:xfrm>
+        </p:grpSpPr>
+        <p:sp>
+          <p:nvSpPr>
+            <p:cNvPr id="4" name="Oval 3">
+              <a:extLst>
+                <a:ext uri="{FF2B5EF4-FFF2-40B4-BE49-F238E27FC236}">
+                  <a16:creationId xmlns:a16="http://schemas.microsoft.com/office/drawing/2014/main" id="{F89B843D-54B5-FE41-9A9D-395372D723D7}"/>
+                </a:ext>
+              </a:extLst>
+            </p:cNvPr>
+            <p:cNvSpPr/>
+            <p:nvPr/>
+          </p:nvSpPr>
+          <p:spPr>
+            <a:xfrm rot="1537887">
+              <a:off x="4398619" y="241211"/>
+              <a:ext cx="721217" cy="2063839"/>
+            </a:xfrm>
+            <a:prstGeom prst="ellipse">
+              <a:avLst/>
+            </a:prstGeom>
+            <a:gradFill>
+              <a:gsLst>
+                <a:gs pos="21000">
+                  <a:srgbClr val="00B050"/>
+                </a:gs>
+                <a:gs pos="80000">
+                  <a:srgbClr val="457F4E"/>
+                </a:gs>
+              </a:gsLst>
+              <a:lin ang="0" scaled="1"/>
+            </a:gradFill>
+          </p:spPr>
+          <p:style>
+            <a:lnRef idx="2">
+              <a:schemeClr val="accent6">
+                <a:shade val="50000"/>
+              </a:schemeClr>
+            </a:lnRef>
+            <a:fillRef idx="1">
+              <a:schemeClr val="accent6"/>
+            </a:fillRef>
+            <a:effectRef idx="0">
+              <a:schemeClr val="accent6"/>
+            </a:effectRef>
+            <a:fontRef idx="minor">
+              <a:schemeClr val="lt1"/>
+            </a:fontRef>
+          </p:style>
+          <p:txBody>
+            <a:bodyPr rtlCol="0" anchor="ctr"/>
+            <a:lstStyle/>
+            <a:p>
+              <a:pPr algn="ctr"/>
+              <a:endParaRPr lang="en-CH"/>
+            </a:p>
+          </p:txBody>
+        </p:sp>
+        <p:sp>
+          <p:nvSpPr>
+            <p:cNvPr id="12" name="Freeform 11">
+              <a:extLst>
+                <a:ext uri="{FF2B5EF4-FFF2-40B4-BE49-F238E27FC236}">
+                  <a16:creationId xmlns:a16="http://schemas.microsoft.com/office/drawing/2014/main" id="{536A272E-43DE-8D48-85E9-5FA171C4C1DF}"/>
+                </a:ext>
+              </a:extLst>
+            </p:cNvPr>
+            <p:cNvSpPr/>
+            <p:nvPr/>
+          </p:nvSpPr>
+          <p:spPr>
+            <a:xfrm rot="900000">
+              <a:off x="2503604" y="1139966"/>
+              <a:ext cx="3970248" cy="4223300"/>
+            </a:xfrm>
+            <a:custGeom>
+              <a:avLst/>
+              <a:gdLst>
+                <a:gd name="connsiteX0" fmla="*/ 353263 w 2172676"/>
+                <a:gd name="connsiteY0" fmla="*/ 283538 h 2311156"/>
+                <a:gd name="connsiteX1" fmla="*/ 961779 w 2172676"/>
+                <a:gd name="connsiteY1" fmla="*/ 565613 h 2311156"/>
+                <a:gd name="connsiteX2" fmla="*/ 1768358 w 2172676"/>
+                <a:gd name="connsiteY2" fmla="*/ 115291 h 2311156"/>
+                <a:gd name="connsiteX3" fmla="*/ 1795439 w 2172676"/>
+                <a:gd name="connsiteY3" fmla="*/ 143276 h 2311156"/>
+                <a:gd name="connsiteX4" fmla="*/ 1795450 w 2172676"/>
+                <a:gd name="connsiteY4" fmla="*/ 143281 h 2311156"/>
+                <a:gd name="connsiteX5" fmla="*/ 2172676 w 2172676"/>
+                <a:gd name="connsiteY5" fmla="*/ 1116174 h 2311156"/>
+                <a:gd name="connsiteX6" fmla="*/ 1635798 w 2172676"/>
+                <a:gd name="connsiteY6" fmla="*/ 2134865 h 2311156"/>
+                <a:gd name="connsiteX7" fmla="*/ 1403039 w 2172676"/>
+                <a:gd name="connsiteY7" fmla="*/ 2034411 h 2311156"/>
+                <a:gd name="connsiteX8" fmla="*/ 1355860 w 2172676"/>
+                <a:gd name="connsiteY8" fmla="*/ 1982958 h 2311156"/>
+                <a:gd name="connsiteX9" fmla="*/ 1336498 w 2172676"/>
+                <a:gd name="connsiteY9" fmla="*/ 1964084 h 2311156"/>
+                <a:gd name="connsiteX10" fmla="*/ 1224966 w 2172676"/>
+                <a:gd name="connsiteY10" fmla="*/ 2191748 h 2311156"/>
+                <a:gd name="connsiteX11" fmla="*/ 1173529 w 2172676"/>
+                <a:gd name="connsiteY11" fmla="*/ 2232275 h 2311156"/>
+                <a:gd name="connsiteX12" fmla="*/ 1151382 w 2172676"/>
+                <a:gd name="connsiteY12" fmla="*/ 2252331 h 2311156"/>
+                <a:gd name="connsiteX13" fmla="*/ 1104357 w 2172676"/>
+                <a:gd name="connsiteY13" fmla="*/ 2281132 h 2311156"/>
+                <a:gd name="connsiteX14" fmla="*/ 175091 w 2172676"/>
+                <a:gd name="connsiteY14" fmla="*/ 1601107 h 2311156"/>
+                <a:gd name="connsiteX15" fmla="*/ 487 w 2172676"/>
+                <a:gd name="connsiteY15" fmla="*/ 884793 h 2311156"/>
+                <a:gd name="connsiteX16" fmla="*/ 15964 w 2172676"/>
+                <a:gd name="connsiteY16" fmla="*/ 750121 h 2311156"/>
+                <a:gd name="connsiteX17" fmla="*/ 15128 w 2172676"/>
+                <a:gd name="connsiteY17" fmla="*/ 696496 h 2311156"/>
+                <a:gd name="connsiteX18" fmla="*/ 353263 w 2172676"/>
+                <a:gd name="connsiteY18" fmla="*/ 283538 h 2311156"/>
+              </a:gdLst>
+              <a:ahLst/>
+              <a:cxnLst>
+                <a:cxn ang="0">
+                  <a:pos x="connsiteX0" y="connsiteY0"/>
+                </a:cxn>
+                <a:cxn ang="0">
+                  <a:pos x="connsiteX1" y="connsiteY1"/>
+                </a:cxn>
+                <a:cxn ang="0">
+                  <a:pos x="connsiteX2" y="connsiteY2"/>
+                </a:cxn>
+                <a:cxn ang="0">
+                  <a:pos x="connsiteX3" y="connsiteY3"/>
+                </a:cxn>
+                <a:cxn ang="0">
+                  <a:pos x="connsiteX4" y="connsiteY4"/>
+                </a:cxn>
+                <a:cxn ang="0">
+                  <a:pos x="connsiteX5" y="connsiteY5"/>
+                </a:cxn>
+                <a:cxn ang="0">
+                  <a:pos x="connsiteX6" y="connsiteY6"/>
+                </a:cxn>
+                <a:cxn ang="0">
+                  <a:pos x="connsiteX7" y="connsiteY7"/>
+                </a:cxn>
+                <a:cxn ang="0">
+                  <a:pos x="connsiteX8" y="connsiteY8"/>
+                </a:cxn>
+                <a:cxn ang="0">
+                  <a:pos x="connsiteX9" y="connsiteY9"/>
+                </a:cxn>
+                <a:cxn ang="0">
+                  <a:pos x="connsiteX10" y="connsiteY10"/>
+                </a:cxn>
+                <a:cxn ang="0">
+                  <a:pos x="connsiteX11" y="connsiteY11"/>
+                </a:cxn>
+                <a:cxn ang="0">
+                  <a:pos x="connsiteX12" y="connsiteY12"/>
+                </a:cxn>
+                <a:cxn ang="0">
+                  <a:pos x="connsiteX13" y="connsiteY13"/>
+                </a:cxn>
+                <a:cxn ang="0">
+                  <a:pos x="connsiteX14" y="connsiteY14"/>
+                </a:cxn>
+                <a:cxn ang="0">
+                  <a:pos x="connsiteX15" y="connsiteY15"/>
+                </a:cxn>
+                <a:cxn ang="0">
+                  <a:pos x="connsiteX16" y="connsiteY16"/>
+                </a:cxn>
+                <a:cxn ang="0">
+                  <a:pos x="connsiteX17" y="connsiteY17"/>
+                </a:cxn>
+                <a:cxn ang="0">
+                  <a:pos x="connsiteX18" y="connsiteY18"/>
+                </a:cxn>
+              </a:cxnLst>
+              <a:rect l="l" t="t" r="r" b="b"/>
+              <a:pathLst>
+                <a:path w="2172676" h="2311156">
+                  <a:moveTo>
+                    <a:pt x="353263" y="283538"/>
+                  </a:moveTo>
+                  <a:cubicBezTo>
+                    <a:pt x="541666" y="236314"/>
+                    <a:pt x="774959" y="308285"/>
+                    <a:pt x="961779" y="565613"/>
+                  </a:cubicBezTo>
+                  <a:cubicBezTo>
+                    <a:pt x="1020673" y="3368"/>
+                    <a:pt x="1499671" y="-124979"/>
+                    <a:pt x="1768358" y="115291"/>
+                  </a:cubicBezTo>
+                  <a:lnTo>
+                    <a:pt x="1795439" y="143276"/>
+                  </a:lnTo>
+                  <a:lnTo>
+                    <a:pt x="1795450" y="143281"/>
+                  </a:lnTo>
+                  <a:cubicBezTo>
+                    <a:pt x="2013996" y="272259"/>
+                    <a:pt x="2172676" y="659055"/>
+                    <a:pt x="2172676" y="1116174"/>
+                  </a:cubicBezTo>
+                  <a:cubicBezTo>
+                    <a:pt x="2172676" y="1678782"/>
+                    <a:pt x="1932308" y="2134865"/>
+                    <a:pt x="1635798" y="2134865"/>
+                  </a:cubicBezTo>
+                  <a:cubicBezTo>
+                    <a:pt x="1552404" y="2134865"/>
+                    <a:pt x="1473452" y="2098788"/>
+                    <a:pt x="1403039" y="2034411"/>
+                  </a:cubicBezTo>
+                  <a:lnTo>
+                    <a:pt x="1355860" y="1982958"/>
+                  </a:lnTo>
+                  <a:lnTo>
+                    <a:pt x="1336498" y="1964084"/>
+                  </a:lnTo>
+                  <a:cubicBezTo>
+                    <a:pt x="1320694" y="2062784"/>
+                    <a:pt x="1279330" y="2138442"/>
+                    <a:pt x="1224966" y="2191748"/>
+                  </a:cubicBezTo>
+                  <a:lnTo>
+                    <a:pt x="1173529" y="2232275"/>
+                  </a:lnTo>
+                  <a:lnTo>
+                    <a:pt x="1151382" y="2252331"/>
+                  </a:lnTo>
+                  <a:cubicBezTo>
+                    <a:pt x="1136688" y="2263372"/>
+                    <a:pt x="1121012" y="2273004"/>
+                    <a:pt x="1104357" y="2281132"/>
+                  </a:cubicBezTo>
+                  <a:cubicBezTo>
+                    <a:pt x="837886" y="2411176"/>
+                    <a:pt x="421839" y="2106719"/>
+                    <a:pt x="175091" y="1601107"/>
+                  </a:cubicBezTo>
+                  <a:cubicBezTo>
+                    <a:pt x="51716" y="1348302"/>
+                    <a:pt x="-5975" y="1093075"/>
+                    <a:pt x="487" y="884793"/>
+                  </a:cubicBezTo>
+                  <a:lnTo>
+                    <a:pt x="15964" y="750121"/>
+                  </a:lnTo>
+                  <a:lnTo>
+                    <a:pt x="15128" y="696496"/>
+                  </a:lnTo>
+                  <a:cubicBezTo>
+                    <a:pt x="30229" y="487036"/>
+                    <a:pt x="170663" y="329306"/>
+                    <a:pt x="353263" y="283538"/>
+                  </a:cubicBezTo>
+                  <a:close/>
+                </a:path>
+              </a:pathLst>
+            </a:custGeom>
+            <a:gradFill>
+              <a:gsLst>
+                <a:gs pos="6000">
+                  <a:srgbClr val="FF2332"/>
+                </a:gs>
+                <a:gs pos="85000">
+                  <a:srgbClr val="A21914"/>
+                </a:gs>
+              </a:gsLst>
+              <a:lin ang="0" scaled="1"/>
+            </a:gradFill>
+            <a:ln>
+              <a:noFill/>
+            </a:ln>
+          </p:spPr>
+          <p:style>
+            <a:lnRef idx="2">
+              <a:schemeClr val="accent1">
+                <a:shade val="50000"/>
+              </a:schemeClr>
+            </a:lnRef>
+            <a:fillRef idx="1">
+              <a:schemeClr val="accent1"/>
+            </a:fillRef>
+            <a:effectRef idx="0">
+              <a:schemeClr val="accent1"/>
+            </a:effectRef>
+            <a:fontRef idx="minor">
+              <a:schemeClr val="lt1"/>
+            </a:fontRef>
+          </p:style>
+          <p:txBody>
+            <a:bodyPr rtlCol="0" anchor="ctr"/>
+            <a:lstStyle/>
+            <a:p>
+              <a:pPr algn="ctr"/>
+              <a:endParaRPr lang="en-CH"/>
+            </a:p>
+          </p:txBody>
+        </p:sp>
+      </p:grpSp>
+      <p:sp>
+        <p:nvSpPr>
+          <p:cNvPr id="2" name="Rectangle 1">
+            <a:extLst>
+              <a:ext uri="{FF2B5EF4-FFF2-40B4-BE49-F238E27FC236}">
+                <a16:creationId xmlns:a16="http://schemas.microsoft.com/office/drawing/2014/main" id="{301C2D5C-1110-6D4C-903E-BAC735C5C64D}"/>
+              </a:ext>
+            </a:extLst>
+          </p:cNvPr>
+          <p:cNvSpPr/>
+          <p:nvPr/>
+        </p:nvSpPr>
+        <p:spPr>
+          <a:xfrm>
+            <a:off x="257577" y="5633421"/>
+            <a:ext cx="11346288" cy="1037816"/>
+          </a:xfrm>
+          <a:prstGeom prst="rect">
+            <a:avLst/>
+          </a:prstGeom>
+          <a:gradFill>
+            <a:gsLst>
+              <a:gs pos="78000">
+                <a:schemeClr val="accent3">
+                  <a:lumMod val="75000"/>
+                </a:schemeClr>
+              </a:gs>
+              <a:gs pos="11000">
+                <a:srgbClr val="00B050"/>
+              </a:gs>
+              <a:gs pos="31000">
+                <a:schemeClr val="accent2">
+                  <a:lumMod val="49000"/>
+                </a:schemeClr>
+              </a:gs>
+            </a:gsLst>
+            <a:lin ang="5400000" scaled="1"/>
+          </a:gradFill>
+          <a:ln>
+            <a:noFill/>
+          </a:ln>
+        </p:spPr>
+        <p:style>
+          <a:lnRef idx="2">
+            <a:schemeClr val="accent6">
+              <a:shade val="50000"/>
+            </a:schemeClr>
+          </a:lnRef>
+          <a:fillRef idx="1">
+            <a:schemeClr val="accent6"/>
+          </a:fillRef>
+          <a:effectRef idx="0">
+            <a:schemeClr val="accent6"/>
+          </a:effectRef>
+          <a:fontRef idx="minor">
+            <a:schemeClr val="lt1"/>
+          </a:fontRef>
+        </p:style>
+        <p:txBody>
+          <a:bodyPr rtlCol="0" anchor="ctr"/>
+          <a:lstStyle/>
+          <a:p>
+            <a:pPr algn="ctr"/>
+            <a:endParaRPr lang="en-CH"/>
+          </a:p>
+        </p:txBody>
+      </p:sp>
+    </p:spTree>
+    <p:extLst>
+      <p:ext uri="{BB962C8B-B14F-4D97-AF65-F5344CB8AC3E}">
+        <p14:creationId xmlns:p14="http://schemas.microsoft.com/office/powerpoint/2010/main" val="1904544972"/>
+      </p:ext>
+    </p:extLst>
+  </p:cSld>
+  <p:clrMapOvr>
+    <a:masterClrMapping/>
+  </p:clrMapOvr>
+</p:sld>
+</file>
+
+<file path=ppt/slides/slide15.xml><?xml version="1.0" encoding="utf-8"?>
+<p:sld xmlns:a="http://schemas.openxmlformats.org/drawingml/2006/main" xmlns:r="http://schemas.openxmlformats.org/officeDocument/2006/relationships" xmlns:p="http://schemas.openxmlformats.org/presentationml/2006/main">
+  <p:cSld>
+    <p:spTree>
+      <p:nvGrpSpPr>
+        <p:cNvPr id="1" name=""/>
+        <p:cNvGrpSpPr/>
+        <p:nvPr/>
+      </p:nvGrpSpPr>
+      <p:grpSpPr>
+        <a:xfrm>
+          <a:off x="0" y="0"/>
+          <a:ext cx="0" cy="0"/>
+          <a:chOff x="0" y="0"/>
+          <a:chExt cx="0" cy="0"/>
+        </a:xfrm>
+      </p:grpSpPr>
+    </p:spTree>
+    <p:extLst>
+      <p:ext uri="{BB962C8B-B14F-4D97-AF65-F5344CB8AC3E}">
+        <p14:creationId xmlns:p14="http://schemas.microsoft.com/office/powerpoint/2010/main" val="537851314"/>
+      </p:ext>
+    </p:extLst>
+  </p:cSld>
+  <p:clrMapOvr>
+    <a:masterClrMapping/>
+  </p:clrMapOvr>
+</p:sld>
+</file>
+
+<file path=ppt/slides/slide16.xml><?xml version="1.0" encoding="utf-8"?>
 <p:sld xmlns:a="http://schemas.openxmlformats.org/drawingml/2006/main" xmlns:r="http://schemas.openxmlformats.org/officeDocument/2006/relationships" xmlns:p="http://schemas.openxmlformats.org/presentationml/2006/main">
   <p:cSld>
     <p:spTree>

</xml_diff>